<commit_message>
Aggiunta pagina per i casi limite
</commit_message>
<xml_diff>
--- a/AstrofotografiaProgetto.pptx
+++ b/AstrofotografiaProgetto.pptx
@@ -5,7 +5,7 @@
     <p:sldMasterId id="2147483648" r:id="rId1"/>
   </p:sldMasterIdLst>
   <p:notesMasterIdLst>
-    <p:notesMasterId r:id="rId8"/>
+    <p:notesMasterId r:id="rId9"/>
   </p:notesMasterIdLst>
   <p:sldIdLst>
     <p:sldId id="256" r:id="rId2"/>
@@ -13,7 +13,8 @@
     <p:sldId id="258" r:id="rId4"/>
     <p:sldId id="259" r:id="rId5"/>
     <p:sldId id="260" r:id="rId6"/>
-    <p:sldId id="261" r:id="rId7"/>
+    <p:sldId id="262" r:id="rId7"/>
+    <p:sldId id="261" r:id="rId8"/>
   </p:sldIdLst>
   <p:sldSz cx="12192000" cy="6858000"/>
   <p:notesSz cx="6858000" cy="9144000"/>
@@ -112,6 +113,11 @@
       </a:defRPr>
     </a:lvl9pPr>
   </p:defaultTextStyle>
+  <p:extLst>
+    <p:ext uri="{EFAFB233-063F-42B5-8137-9DF3F51BA10A}">
+      <p15:sldGuideLst xmlns:p15="http://schemas.microsoft.com/office/powerpoint/2012/main"/>
+    </p:ext>
+  </p:extLst>
 </p:presentation>
 </file>
 
@@ -128,7 +134,7 @@
   <pc:docChgLst>
     <pc:chgData name="ignazio emanuele picciche'" userId="0ffc6f3f-5a1e-4bcf-8207-6fcee5da7ade" providerId="ADAL" clId="{17056212-C789-4D94-A224-491696FC5D6E}"/>
     <pc:docChg chg="undo custSel addSld modSld">
-      <pc:chgData name="ignazio emanuele picciche'" userId="0ffc6f3f-5a1e-4bcf-8207-6fcee5da7ade" providerId="ADAL" clId="{17056212-C789-4D94-A224-491696FC5D6E}" dt="2023-12-08T22:07:29.623" v="2448" actId="1076"/>
+      <pc:chgData name="ignazio emanuele picciche'" userId="0ffc6f3f-5a1e-4bcf-8207-6fcee5da7ade" providerId="ADAL" clId="{17056212-C789-4D94-A224-491696FC5D6E}" dt="2023-12-08T22:12:09.612" v="2471" actId="20577"/>
       <pc:docMkLst>
         <pc:docMk/>
       </pc:docMkLst>
@@ -542,6 +548,21 @@
           </ac:spMkLst>
         </pc:spChg>
       </pc:sldChg>
+      <pc:sldChg chg="modSp add mod">
+        <pc:chgData name="ignazio emanuele picciche'" userId="0ffc6f3f-5a1e-4bcf-8207-6fcee5da7ade" providerId="ADAL" clId="{17056212-C789-4D94-A224-491696FC5D6E}" dt="2023-12-08T22:12:09.612" v="2471" actId="20577"/>
+        <pc:sldMkLst>
+          <pc:docMk/>
+          <pc:sldMk cId="203031930" sldId="262"/>
+        </pc:sldMkLst>
+        <pc:spChg chg="mod">
+          <ac:chgData name="ignazio emanuele picciche'" userId="0ffc6f3f-5a1e-4bcf-8207-6fcee5da7ade" providerId="ADAL" clId="{17056212-C789-4D94-A224-491696FC5D6E}" dt="2023-12-08T22:12:09.612" v="2471" actId="20577"/>
+          <ac:spMkLst>
+            <pc:docMk/>
+            <pc:sldMk cId="203031930" sldId="262"/>
+            <ac:spMk id="9" creationId="{7DCA9D16-5034-279C-FF1F-96C45AF4B68F}"/>
+          </ac:spMkLst>
+        </pc:spChg>
+      </pc:sldChg>
     </pc:docChg>
   </pc:docChgLst>
 </pc:chgInfo>
@@ -1131,6 +1152,90 @@
             <a:fld id="{21590A60-A07C-46F9-8B65-B35F273389B3}" type="slidenum">
               <a:rPr lang="en-GB" smtClean="0"/>
               <a:t>6</a:t>
+            </a:fld>
+            <a:endParaRPr lang="en-GB"/>
+          </a:p>
+        </p:txBody>
+      </p:sp>
+    </p:spTree>
+    <p:extLst>
+      <p:ext uri="{BB962C8B-B14F-4D97-AF65-F5344CB8AC3E}">
+        <p14:creationId xmlns:p14="http://schemas.microsoft.com/office/powerpoint/2010/main" val="1931353061"/>
+      </p:ext>
+    </p:extLst>
+  </p:cSld>
+  <p:clrMapOvr>
+    <a:masterClrMapping/>
+  </p:clrMapOvr>
+</p:notes>
+</file>
+
+<file path=ppt/notesSlides/notesSlide4.xml><?xml version="1.0" encoding="utf-8"?>
+<p:notes xmlns:a="http://schemas.openxmlformats.org/drawingml/2006/main" xmlns:r="http://schemas.openxmlformats.org/officeDocument/2006/relationships" xmlns:p="http://schemas.openxmlformats.org/presentationml/2006/main">
+  <p:cSld>
+    <p:spTree>
+      <p:nvGrpSpPr>
+        <p:cNvPr id="1" name=""/>
+        <p:cNvGrpSpPr/>
+        <p:nvPr/>
+      </p:nvGrpSpPr>
+      <p:grpSpPr>
+        <a:xfrm>
+          <a:off x="0" y="0"/>
+          <a:ext cx="0" cy="0"/>
+          <a:chOff x="0" y="0"/>
+          <a:chExt cx="0" cy="0"/>
+        </a:xfrm>
+      </p:grpSpPr>
+      <p:sp>
+        <p:nvSpPr>
+          <p:cNvPr id="2" name="Slide Image Placeholder 1"/>
+          <p:cNvSpPr>
+            <a:spLocks noGrp="1" noRot="1" noChangeAspect="1"/>
+          </p:cNvSpPr>
+          <p:nvPr>
+            <p:ph type="sldImg"/>
+          </p:nvPr>
+        </p:nvSpPr>
+        <p:spPr/>
+      </p:sp>
+      <p:sp>
+        <p:nvSpPr>
+          <p:cNvPr id="3" name="Notes Placeholder 2"/>
+          <p:cNvSpPr>
+            <a:spLocks noGrp="1"/>
+          </p:cNvSpPr>
+          <p:nvPr>
+            <p:ph type="body" idx="1"/>
+          </p:nvPr>
+        </p:nvSpPr>
+        <p:spPr/>
+        <p:txBody>
+          <a:bodyPr/>
+          <a:lstStyle/>
+          <a:p>
+            <a:endParaRPr lang="en-GB" dirty="0"/>
+          </a:p>
+        </p:txBody>
+      </p:sp>
+      <p:sp>
+        <p:nvSpPr>
+          <p:cNvPr id="4" name="Slide Number Placeholder 3"/>
+          <p:cNvSpPr>
+            <a:spLocks noGrp="1"/>
+          </p:cNvSpPr>
+          <p:nvPr>
+            <p:ph type="sldNum" sz="quarter" idx="5"/>
+          </p:nvPr>
+        </p:nvSpPr>
+        <p:spPr/>
+        <p:txBody>
+          <a:bodyPr/>
+          <a:lstStyle/>
+          <a:p>
+            <a:fld id="{21590A60-A07C-46F9-8B65-B35F273389B3}" type="slidenum">
+              <a:rPr lang="en-GB" smtClean="0"/>
+              <a:t>7</a:t>
             </a:fld>
             <a:endParaRPr lang="en-GB"/>
           </a:p>
@@ -6469,6 +6574,218 @@
 </file>
 
 <file path=ppt/slides/slide6.xml><?xml version="1.0" encoding="utf-8"?>
+<p:sld xmlns:a="http://schemas.openxmlformats.org/drawingml/2006/main" xmlns:r="http://schemas.openxmlformats.org/officeDocument/2006/relationships" xmlns:p="http://schemas.openxmlformats.org/presentationml/2006/main">
+  <p:cSld>
+    <p:bg>
+      <p:bgPr>
+        <a:solidFill>
+          <a:srgbClr val="000000"/>
+        </a:solidFill>
+        <a:effectLst/>
+      </p:bgPr>
+    </p:bg>
+    <p:spTree>
+      <p:nvGrpSpPr>
+        <p:cNvPr id="1" name=""/>
+        <p:cNvGrpSpPr/>
+        <p:nvPr/>
+      </p:nvGrpSpPr>
+      <p:grpSpPr>
+        <a:xfrm>
+          <a:off x="0" y="0"/>
+          <a:ext cx="0" cy="0"/>
+          <a:chOff x="0" y="0"/>
+          <a:chExt cx="0" cy="0"/>
+        </a:xfrm>
+      </p:grpSpPr>
+      <p:sp>
+        <p:nvSpPr>
+          <p:cNvPr id="10" name="Rectangle 9">
+            <a:extLst>
+              <a:ext uri="{FF2B5EF4-FFF2-40B4-BE49-F238E27FC236}">
+                <a16:creationId xmlns:a16="http://schemas.microsoft.com/office/drawing/2014/main" id="{71B2258F-86CA-4D4D-8270-BC05FCDEBFB3}"/>
+              </a:ext>
+              <a:ext uri="{C183D7F6-B498-43B3-948B-1728B52AA6E4}">
+                <adec:decorative xmlns:adec="http://schemas.microsoft.com/office/drawing/2017/decorative" val="1"/>
+              </a:ext>
+            </a:extLst>
+          </p:cNvPr>
+          <p:cNvSpPr>
+            <a:spLocks noGrp="1" noRot="1" noChangeAspect="1" noMove="1" noResize="1" noEditPoints="1" noAdjustHandles="1" noChangeArrowheads="1" noChangeShapeType="1" noTextEdit="1"/>
+          </p:cNvSpPr>
+          <p:nvPr>
+            <p:extLst>
+              <p:ext uri="{386F3935-93C4-4BCD-93E2-E3B085C9AB24}">
+                <p16:designElem xmlns:p16="http://schemas.microsoft.com/office/powerpoint/2015/main" val="1"/>
+              </p:ext>
+            </p:extLst>
+          </p:nvPr>
+        </p:nvSpPr>
+        <p:spPr>
+          <a:xfrm>
+            <a:off x="0" y="0"/>
+            <a:ext cx="12192000" cy="6857999"/>
+          </a:xfrm>
+          <a:prstGeom prst="rect">
+            <a:avLst/>
+          </a:prstGeom>
+          <a:solidFill>
+            <a:srgbClr val="000000"/>
+          </a:solidFill>
+          <a:ln>
+            <a:noFill/>
+          </a:ln>
+        </p:spPr>
+        <p:style>
+          <a:lnRef idx="2">
+            <a:schemeClr val="accent1">
+              <a:shade val="50000"/>
+            </a:schemeClr>
+          </a:lnRef>
+          <a:fillRef idx="1">
+            <a:schemeClr val="accent1"/>
+          </a:fillRef>
+          <a:effectRef idx="0">
+            <a:schemeClr val="accent1"/>
+          </a:effectRef>
+          <a:fontRef idx="minor">
+            <a:schemeClr val="lt1"/>
+          </a:fontRef>
+        </p:style>
+        <p:txBody>
+          <a:bodyPr rtlCol="0" anchor="ctr"/>
+          <a:lstStyle/>
+          <a:p>
+            <a:pPr algn="ctr"/>
+            <a:endParaRPr lang="en-US"/>
+          </a:p>
+        </p:txBody>
+      </p:sp>
+      <p:pic>
+        <p:nvPicPr>
+          <p:cNvPr id="5" name="Picture 4" descr="A galaxy in the sky&#10;&#10;Description automatically generated with medium confidence">
+            <a:extLst>
+              <a:ext uri="{FF2B5EF4-FFF2-40B4-BE49-F238E27FC236}">
+                <a16:creationId xmlns:a16="http://schemas.microsoft.com/office/drawing/2014/main" id="{B0F90A88-2372-3D69-96D2-BB8F636DDE9E}"/>
+              </a:ext>
+            </a:extLst>
+          </p:cNvPr>
+          <p:cNvPicPr>
+            <a:picLocks noChangeAspect="1"/>
+          </p:cNvPicPr>
+          <p:nvPr/>
+        </p:nvPicPr>
+        <p:blipFill rotWithShape="1">
+          <a:blip r:embed="rId3">
+            <a:alphaModFix amt="50000"/>
+            <a:extLst>
+              <a:ext uri="{28A0092B-C50C-407E-A947-70E740481C1C}">
+                <a14:useLocalDpi xmlns:a14="http://schemas.microsoft.com/office/drawing/2010/main" val="0"/>
+              </a:ext>
+            </a:extLst>
+          </a:blip>
+          <a:srcRect/>
+          <a:stretch/>
+        </p:blipFill>
+        <p:spPr>
+          <a:xfrm>
+            <a:off x="0" y="0"/>
+            <a:ext cx="12192000" cy="6858000"/>
+          </a:xfrm>
+          <a:prstGeom prst="rect">
+            <a:avLst/>
+          </a:prstGeom>
+        </p:spPr>
+      </p:pic>
+      <p:sp>
+        <p:nvSpPr>
+          <p:cNvPr id="9" name="TextBox 8">
+            <a:extLst>
+              <a:ext uri="{FF2B5EF4-FFF2-40B4-BE49-F238E27FC236}">
+                <a16:creationId xmlns:a16="http://schemas.microsoft.com/office/drawing/2014/main" id="{7DCA9D16-5034-279C-FF1F-96C45AF4B68F}"/>
+              </a:ext>
+            </a:extLst>
+          </p:cNvPr>
+          <p:cNvSpPr txBox="1"/>
+          <p:nvPr/>
+        </p:nvSpPr>
+        <p:spPr>
+          <a:xfrm>
+            <a:off x="301732" y="293576"/>
+            <a:ext cx="3456452" cy="523220"/>
+          </a:xfrm>
+          <a:prstGeom prst="rect">
+            <a:avLst/>
+          </a:prstGeom>
+          <a:noFill/>
+        </p:spPr>
+        <p:txBody>
+          <a:bodyPr wrap="square" rtlCol="0">
+            <a:spAutoFit/>
+          </a:bodyPr>
+          <a:lstStyle/>
+          <a:p>
+            <a:r>
+              <a:rPr lang="en-GB" sz="2800" b="1" dirty="0" err="1"/>
+              <a:t>Casi</a:t>
+            </a:r>
+            <a:r>
+              <a:rPr lang="en-GB" sz="2800" b="1" dirty="0"/>
+              <a:t> limite</a:t>
+            </a:r>
+          </a:p>
+        </p:txBody>
+      </p:sp>
+      <p:pic>
+        <p:nvPicPr>
+          <p:cNvPr id="15" name="Picture 14" descr="A blue and white logo&#10;&#10;Description automatically generated">
+            <a:extLst>
+              <a:ext uri="{FF2B5EF4-FFF2-40B4-BE49-F238E27FC236}">
+                <a16:creationId xmlns:a16="http://schemas.microsoft.com/office/drawing/2014/main" id="{6A2D2119-B5CD-B2DE-2CB9-9300E3B94F14}"/>
+              </a:ext>
+            </a:extLst>
+          </p:cNvPr>
+          <p:cNvPicPr>
+            <a:picLocks noChangeAspect="1"/>
+          </p:cNvPicPr>
+          <p:nvPr/>
+        </p:nvPicPr>
+        <p:blipFill>
+          <a:blip r:embed="rId4">
+            <a:extLst>
+              <a:ext uri="{28A0092B-C50C-407E-A947-70E740481C1C}">
+                <a14:useLocalDpi xmlns:a14="http://schemas.microsoft.com/office/drawing/2010/main" val="0"/>
+              </a:ext>
+            </a:extLst>
+          </a:blip>
+          <a:stretch>
+            <a:fillRect/>
+          </a:stretch>
+        </p:blipFill>
+        <p:spPr>
+          <a:xfrm>
+            <a:off x="10585151" y="264938"/>
+            <a:ext cx="1305117" cy="1098396"/>
+          </a:xfrm>
+          <a:prstGeom prst="rect">
+            <a:avLst/>
+          </a:prstGeom>
+        </p:spPr>
+      </p:pic>
+    </p:spTree>
+    <p:extLst>
+      <p:ext uri="{BB962C8B-B14F-4D97-AF65-F5344CB8AC3E}">
+        <p14:creationId xmlns:p14="http://schemas.microsoft.com/office/powerpoint/2010/main" val="203031930"/>
+      </p:ext>
+    </p:extLst>
+  </p:cSld>
+  <p:clrMapOvr>
+    <a:overrideClrMapping bg1="dk1" tx1="lt1" bg2="dk2" tx2="lt2" accent1="accent1" accent2="accent2" accent3="accent3" accent4="accent4" accent5="accent5" accent6="accent6" hlink="hlink" folHlink="folHlink"/>
+  </p:clrMapOvr>
+</p:sld>
+</file>
+
+<file path=ppt/slides/slide7.xml><?xml version="1.0" encoding="utf-8"?>
 <p:sld xmlns:a="http://schemas.openxmlformats.org/drawingml/2006/main" xmlns:r="http://schemas.openxmlformats.org/officeDocument/2006/relationships" xmlns:p="http://schemas.openxmlformats.org/presentationml/2006/main">
   <p:cSld>
     <p:bg>

</xml_diff>

<commit_message>
implementati i casi di test del ppt
</commit_message>
<xml_diff>
--- a/AstrofotografiaProgetto.pptx
+++ b/AstrofotografiaProgetto.pptx
@@ -5,7 +5,7 @@
     <p:sldMasterId id="2147483648" r:id="rId1"/>
   </p:sldMasterIdLst>
   <p:notesMasterIdLst>
-    <p:notesMasterId r:id="rId18"/>
+    <p:notesMasterId r:id="rId23"/>
   </p:notesMasterIdLst>
   <p:sldIdLst>
     <p:sldId id="256" r:id="rId2"/>
@@ -22,8 +22,13 @@
     <p:sldId id="270" r:id="rId13"/>
     <p:sldId id="260" r:id="rId14"/>
     <p:sldId id="262" r:id="rId15"/>
-    <p:sldId id="271" r:id="rId16"/>
-    <p:sldId id="261" r:id="rId17"/>
+    <p:sldId id="273" r:id="rId16"/>
+    <p:sldId id="275" r:id="rId17"/>
+    <p:sldId id="276" r:id="rId18"/>
+    <p:sldId id="277" r:id="rId19"/>
+    <p:sldId id="274" r:id="rId20"/>
+    <p:sldId id="271" r:id="rId21"/>
+    <p:sldId id="261" r:id="rId22"/>
   </p:sldIdLst>
   <p:sldSz cx="12192000" cy="6858000"/>
   <p:notesSz cx="6858000" cy="9144000"/>
@@ -133,7 +138,7 @@
 <file path=ppt/revisionInfo.xml><?xml version="1.0" encoding="utf-8"?>
 <p1510:revInfo xmlns:a="http://schemas.openxmlformats.org/drawingml/2006/main" xmlns:r="http://schemas.openxmlformats.org/officeDocument/2006/relationships" xmlns:p1510="http://schemas.microsoft.com/office/powerpoint/2015/10/main">
   <p1510:revLst>
-    <p1510:client id="{17056212-C789-4D94-A224-491696FC5D6E}" v="37" dt="2023-12-11T21:55:06.388"/>
+    <p1510:client id="{17056212-C789-4D94-A224-491696FC5D6E}" v="42" dt="2023-12-12T19:07:31.117"/>
   </p1510:revLst>
 </p1510:revInfo>
 </file>
@@ -143,7 +148,7 @@
   <pc:docChgLst>
     <pc:chgData name="ignazio emanuele picciche'" userId="0ffc6f3f-5a1e-4bcf-8207-6fcee5da7ade" providerId="ADAL" clId="{17056212-C789-4D94-A224-491696FC5D6E}"/>
     <pc:docChg chg="undo custSel addSld delSld modSld sldOrd">
-      <pc:chgData name="ignazio emanuele picciche'" userId="0ffc6f3f-5a1e-4bcf-8207-6fcee5da7ade" providerId="ADAL" clId="{17056212-C789-4D94-A224-491696FC5D6E}" dt="2023-12-11T22:07:06.784" v="3088" actId="1076"/>
+      <pc:chgData name="ignazio emanuele picciche'" userId="0ffc6f3f-5a1e-4bcf-8207-6fcee5da7ade" providerId="ADAL" clId="{17056212-C789-4D94-A224-491696FC5D6E}" dt="2023-12-12T19:20:23.664" v="3400" actId="14100"/>
       <pc:docMkLst>
         <pc:docMk/>
       </pc:docMkLst>
@@ -489,7 +494,7 @@
         </pc:picChg>
       </pc:sldChg>
       <pc:sldChg chg="addSp delSp modSp add mod setBg setClrOvrMap">
-        <pc:chgData name="ignazio emanuele picciche'" userId="0ffc6f3f-5a1e-4bcf-8207-6fcee5da7ade" providerId="ADAL" clId="{17056212-C789-4D94-A224-491696FC5D6E}" dt="2023-12-11T21:38:27.175" v="2958"/>
+        <pc:chgData name="ignazio emanuele picciche'" userId="0ffc6f3f-5a1e-4bcf-8207-6fcee5da7ade" providerId="ADAL" clId="{17056212-C789-4D94-A224-491696FC5D6E}" dt="2023-12-12T18:50:35.424" v="3136" actId="1076"/>
         <pc:sldMkLst>
           <pc:docMk/>
           <pc:sldMk cId="1499551055" sldId="259"/>
@@ -500,6 +505,14 @@
             <pc:docMk/>
             <pc:sldMk cId="1499551055" sldId="259"/>
             <ac:spMk id="2" creationId="{47F597DE-3A6B-AA76-D8AD-A33C03B6D621}"/>
+          </ac:spMkLst>
+        </pc:spChg>
+        <pc:spChg chg="mod">
+          <ac:chgData name="ignazio emanuele picciche'" userId="0ffc6f3f-5a1e-4bcf-8207-6fcee5da7ade" providerId="ADAL" clId="{17056212-C789-4D94-A224-491696FC5D6E}" dt="2023-12-12T18:45:37.262" v="3108" actId="1076"/>
+          <ac:spMkLst>
+            <pc:docMk/>
+            <pc:sldMk cId="1499551055" sldId="259"/>
+            <ac:spMk id="3" creationId="{14A55531-9273-7D94-A16A-AF2BDA27A080}"/>
           </ac:spMkLst>
         </pc:spChg>
         <pc:spChg chg="add del">
@@ -1407,7 +1420,7 @@
           </ac:picMkLst>
         </pc:picChg>
         <pc:picChg chg="add mod">
-          <ac:chgData name="ignazio emanuele picciche'" userId="0ffc6f3f-5a1e-4bcf-8207-6fcee5da7ade" providerId="ADAL" clId="{17056212-C789-4D94-A224-491696FC5D6E}" dt="2023-12-11T21:38:27.175" v="2958"/>
+          <ac:chgData name="ignazio emanuele picciche'" userId="0ffc6f3f-5a1e-4bcf-8207-6fcee5da7ade" providerId="ADAL" clId="{17056212-C789-4D94-A224-491696FC5D6E}" dt="2023-12-12T18:50:35.424" v="3136" actId="1076"/>
           <ac:picMkLst>
             <pc:docMk/>
             <pc:sldMk cId="1499551055" sldId="259"/>
@@ -2533,12 +2546,20 @@
           </ac:spMkLst>
         </pc:spChg>
       </pc:sldChg>
-      <pc:sldChg chg="modSp add mod">
-        <pc:chgData name="ignazio emanuele picciche'" userId="0ffc6f3f-5a1e-4bcf-8207-6fcee5da7ade" providerId="ADAL" clId="{17056212-C789-4D94-A224-491696FC5D6E}" dt="2023-12-11T21:54:09.408" v="3065" actId="14100"/>
+      <pc:sldChg chg="addSp modSp add mod">
+        <pc:chgData name="ignazio emanuele picciche'" userId="0ffc6f3f-5a1e-4bcf-8207-6fcee5da7ade" providerId="ADAL" clId="{17056212-C789-4D94-A224-491696FC5D6E}" dt="2023-12-12T19:07:45.943" v="3298" actId="20577"/>
         <pc:sldMkLst>
           <pc:docMk/>
           <pc:sldMk cId="203031930" sldId="262"/>
         </pc:sldMkLst>
+        <pc:spChg chg="add mod">
+          <ac:chgData name="ignazio emanuele picciche'" userId="0ffc6f3f-5a1e-4bcf-8207-6fcee5da7ade" providerId="ADAL" clId="{17056212-C789-4D94-A224-491696FC5D6E}" dt="2023-12-12T19:07:45.943" v="3298" actId="20577"/>
+          <ac:spMkLst>
+            <pc:docMk/>
+            <pc:sldMk cId="203031930" sldId="262"/>
+            <ac:spMk id="4" creationId="{0001FB6F-5E9B-D958-E30A-9344EB18D7EB}"/>
+          </ac:spMkLst>
+        </pc:spChg>
         <pc:spChg chg="mod">
           <ac:chgData name="ignazio emanuele picciche'" userId="0ffc6f3f-5a1e-4bcf-8207-6fcee5da7ade" providerId="ADAL" clId="{17056212-C789-4D94-A224-491696FC5D6E}" dt="2023-12-11T21:54:09.408" v="3065" actId="14100"/>
           <ac:spMkLst>
@@ -2547,6 +2568,14 @@
             <ac:spMk id="9" creationId="{7DCA9D16-5034-279C-FF1F-96C45AF4B68F}"/>
           </ac:spMkLst>
         </pc:spChg>
+        <pc:picChg chg="add mod">
+          <ac:chgData name="ignazio emanuele picciche'" userId="0ffc6f3f-5a1e-4bcf-8207-6fcee5da7ade" providerId="ADAL" clId="{17056212-C789-4D94-A224-491696FC5D6E}" dt="2023-12-12T19:05:13.453" v="3202" actId="1076"/>
+          <ac:picMkLst>
+            <pc:docMk/>
+            <pc:sldMk cId="203031930" sldId="262"/>
+            <ac:picMk id="3" creationId="{B9A28941-61E9-8009-E174-BEFAAA40B32C}"/>
+          </ac:picMkLst>
+        </pc:picChg>
       </pc:sldChg>
       <pc:sldChg chg="delSp add del mod">
         <pc:chgData name="ignazio emanuele picciche'" userId="0ffc6f3f-5a1e-4bcf-8207-6fcee5da7ade" providerId="ADAL" clId="{17056212-C789-4D94-A224-491696FC5D6E}" dt="2023-12-11T21:15:07.407" v="2601" actId="47"/>
@@ -2667,7 +2696,7 @@
         </pc:picChg>
       </pc:sldChg>
       <pc:sldChg chg="addSp delSp modSp add mod">
-        <pc:chgData name="ignazio emanuele picciche'" userId="0ffc6f3f-5a1e-4bcf-8207-6fcee5da7ade" providerId="ADAL" clId="{17056212-C789-4D94-A224-491696FC5D6E}" dt="2023-12-11T21:29:09.034" v="2840" actId="1076"/>
+        <pc:chgData name="ignazio emanuele picciche'" userId="0ffc6f3f-5a1e-4bcf-8207-6fcee5da7ade" providerId="ADAL" clId="{17056212-C789-4D94-A224-491696FC5D6E}" dt="2023-12-12T18:45:52.176" v="3109" actId="14100"/>
         <pc:sldMkLst>
           <pc:docMk/>
           <pc:sldMk cId="2556038533" sldId="265"/>
@@ -2678,6 +2707,14 @@
             <pc:docMk/>
             <pc:sldMk cId="2556038533" sldId="265"/>
             <ac:spMk id="9" creationId="{7DCA9D16-5034-279C-FF1F-96C45AF4B68F}"/>
+          </ac:spMkLst>
+        </pc:spChg>
+        <pc:spChg chg="mod">
+          <ac:chgData name="ignazio emanuele picciche'" userId="0ffc6f3f-5a1e-4bcf-8207-6fcee5da7ade" providerId="ADAL" clId="{17056212-C789-4D94-A224-491696FC5D6E}" dt="2023-12-12T18:45:52.176" v="3109" actId="14100"/>
+          <ac:spMkLst>
+            <pc:docMk/>
+            <pc:sldMk cId="2556038533" sldId="265"/>
+            <ac:spMk id="22" creationId="{8CF4B406-EA7E-B37B-213A-A8308F8FC216}"/>
           </ac:spMkLst>
         </pc:spChg>
         <pc:picChg chg="add del mod">
@@ -2697,7 +2734,7 @@
           </ac:picMkLst>
         </pc:picChg>
         <pc:picChg chg="add del mod">
-          <ac:chgData name="ignazio emanuele picciche'" userId="0ffc6f3f-5a1e-4bcf-8207-6fcee5da7ade" providerId="ADAL" clId="{17056212-C789-4D94-A224-491696FC5D6E}" dt="2023-12-11T21:29:09.034" v="2840" actId="1076"/>
+          <ac:chgData name="ignazio emanuele picciche'" userId="0ffc6f3f-5a1e-4bcf-8207-6fcee5da7ade" providerId="ADAL" clId="{17056212-C789-4D94-A224-491696FC5D6E}" dt="2023-12-12T18:43:05.942" v="3099" actId="1076"/>
           <ac:picMkLst>
             <pc:docMk/>
             <pc:sldMk cId="2556038533" sldId="265"/>
@@ -2714,7 +2751,7 @@
         </pc:picChg>
       </pc:sldChg>
       <pc:sldChg chg="addSp delSp modSp add mod">
-        <pc:chgData name="ignazio emanuele picciche'" userId="0ffc6f3f-5a1e-4bcf-8207-6fcee5da7ade" providerId="ADAL" clId="{17056212-C789-4D94-A224-491696FC5D6E}" dt="2023-12-11T21:21:52.906" v="2714"/>
+        <pc:chgData name="ignazio emanuele picciche'" userId="0ffc6f3f-5a1e-4bcf-8207-6fcee5da7ade" providerId="ADAL" clId="{17056212-C789-4D94-A224-491696FC5D6E}" dt="2023-12-12T18:46:37.417" v="3115" actId="1076"/>
         <pc:sldMkLst>
           <pc:docMk/>
           <pc:sldMk cId="3966135989" sldId="266"/>
@@ -2727,6 +2764,14 @@
             <ac:spMk id="9" creationId="{7DCA9D16-5034-279C-FF1F-96C45AF4B68F}"/>
           </ac:spMkLst>
         </pc:spChg>
+        <pc:spChg chg="mod">
+          <ac:chgData name="ignazio emanuele picciche'" userId="0ffc6f3f-5a1e-4bcf-8207-6fcee5da7ade" providerId="ADAL" clId="{17056212-C789-4D94-A224-491696FC5D6E}" dt="2023-12-12T18:46:37.417" v="3115" actId="1076"/>
+          <ac:spMkLst>
+            <pc:docMk/>
+            <pc:sldMk cId="3966135989" sldId="266"/>
+            <ac:spMk id="22" creationId="{8CF4B406-EA7E-B37B-213A-A8308F8FC216}"/>
+          </ac:spMkLst>
+        </pc:spChg>
         <pc:picChg chg="add del mod">
           <ac:chgData name="ignazio emanuele picciche'" userId="0ffc6f3f-5a1e-4bcf-8207-6fcee5da7ade" providerId="ADAL" clId="{17056212-C789-4D94-A224-491696FC5D6E}" dt="2023-12-11T21:21:50.390" v="2712" actId="21"/>
           <ac:picMkLst>
@@ -2736,7 +2781,7 @@
           </ac:picMkLst>
         </pc:picChg>
         <pc:picChg chg="add mod">
-          <ac:chgData name="ignazio emanuele picciche'" userId="0ffc6f3f-5a1e-4bcf-8207-6fcee5da7ade" providerId="ADAL" clId="{17056212-C789-4D94-A224-491696FC5D6E}" dt="2023-12-11T21:21:52.906" v="2714"/>
+          <ac:chgData name="ignazio emanuele picciche'" userId="0ffc6f3f-5a1e-4bcf-8207-6fcee5da7ade" providerId="ADAL" clId="{17056212-C789-4D94-A224-491696FC5D6E}" dt="2023-12-12T18:46:30.376" v="3113" actId="1076"/>
           <ac:picMkLst>
             <pc:docMk/>
             <pc:sldMk cId="3966135989" sldId="266"/>
@@ -2753,7 +2798,7 @@
         </pc:picChg>
       </pc:sldChg>
       <pc:sldChg chg="addSp delSp modSp add mod">
-        <pc:chgData name="ignazio emanuele picciche'" userId="0ffc6f3f-5a1e-4bcf-8207-6fcee5da7ade" providerId="ADAL" clId="{17056212-C789-4D94-A224-491696FC5D6E}" dt="2023-12-11T21:29:13.773" v="2841" actId="1076"/>
+        <pc:chgData name="ignazio emanuele picciche'" userId="0ffc6f3f-5a1e-4bcf-8207-6fcee5da7ade" providerId="ADAL" clId="{17056212-C789-4D94-A224-491696FC5D6E}" dt="2023-12-12T18:49:01.613" v="3132" actId="1076"/>
         <pc:sldMkLst>
           <pc:docMk/>
           <pc:sldMk cId="2218798297" sldId="267"/>
@@ -2764,6 +2809,14 @@
             <pc:docMk/>
             <pc:sldMk cId="2218798297" sldId="267"/>
             <ac:spMk id="9" creationId="{7DCA9D16-5034-279C-FF1F-96C45AF4B68F}"/>
+          </ac:spMkLst>
+        </pc:spChg>
+        <pc:spChg chg="mod">
+          <ac:chgData name="ignazio emanuele picciche'" userId="0ffc6f3f-5a1e-4bcf-8207-6fcee5da7ade" providerId="ADAL" clId="{17056212-C789-4D94-A224-491696FC5D6E}" dt="2023-12-12T18:49:01.613" v="3132" actId="1076"/>
+          <ac:spMkLst>
+            <pc:docMk/>
+            <pc:sldMk cId="2218798297" sldId="267"/>
+            <ac:spMk id="22" creationId="{8CF4B406-EA7E-B37B-213A-A8308F8FC216}"/>
           </ac:spMkLst>
         </pc:spChg>
         <pc:picChg chg="add del mod">
@@ -2799,7 +2852,7 @@
           </ac:picMkLst>
         </pc:picChg>
         <pc:picChg chg="add mod">
-          <ac:chgData name="ignazio emanuele picciche'" userId="0ffc6f3f-5a1e-4bcf-8207-6fcee5da7ade" providerId="ADAL" clId="{17056212-C789-4D94-A224-491696FC5D6E}" dt="2023-12-11T21:29:13.773" v="2841" actId="1076"/>
+          <ac:chgData name="ignazio emanuele picciche'" userId="0ffc6f3f-5a1e-4bcf-8207-6fcee5da7ade" providerId="ADAL" clId="{17056212-C789-4D94-A224-491696FC5D6E}" dt="2023-12-12T18:48:43.204" v="3129" actId="1076"/>
           <ac:picMkLst>
             <pc:docMk/>
             <pc:sldMk cId="2218798297" sldId="267"/>
@@ -2855,7 +2908,7 @@
         </pc:picChg>
       </pc:sldChg>
       <pc:sldChg chg="addSp delSp modSp add mod">
-        <pc:chgData name="ignazio emanuele picciche'" userId="0ffc6f3f-5a1e-4bcf-8207-6fcee5da7ade" providerId="ADAL" clId="{17056212-C789-4D94-A224-491696FC5D6E}" dt="2023-12-11T21:32:27.368" v="2920"/>
+        <pc:chgData name="ignazio emanuele picciche'" userId="0ffc6f3f-5a1e-4bcf-8207-6fcee5da7ade" providerId="ADAL" clId="{17056212-C789-4D94-A224-491696FC5D6E}" dt="2023-12-12T18:47:29.343" v="3127" actId="1076"/>
         <pc:sldMkLst>
           <pc:docMk/>
           <pc:sldMk cId="3547871776" sldId="269"/>
@@ -2866,6 +2919,14 @@
             <pc:docMk/>
             <pc:sldMk cId="3547871776" sldId="269"/>
             <ac:spMk id="9" creationId="{7DCA9D16-5034-279C-FF1F-96C45AF4B68F}"/>
+          </ac:spMkLst>
+        </pc:spChg>
+        <pc:spChg chg="mod">
+          <ac:chgData name="ignazio emanuele picciche'" userId="0ffc6f3f-5a1e-4bcf-8207-6fcee5da7ade" providerId="ADAL" clId="{17056212-C789-4D94-A224-491696FC5D6E}" dt="2023-12-12T18:47:15.816" v="3121" actId="1076"/>
+          <ac:spMkLst>
+            <pc:docMk/>
+            <pc:sldMk cId="3547871776" sldId="269"/>
+            <ac:spMk id="22" creationId="{8CF4B406-EA7E-B37B-213A-A8308F8FC216}"/>
           </ac:spMkLst>
         </pc:spChg>
         <pc:picChg chg="add del mod">
@@ -2884,8 +2945,16 @@
             <ac:picMk id="4" creationId="{9BF51828-B3D8-8E82-A4F3-CB61A789BBE7}"/>
           </ac:picMkLst>
         </pc:picChg>
+        <pc:picChg chg="mod">
+          <ac:chgData name="ignazio emanuele picciche'" userId="0ffc6f3f-5a1e-4bcf-8207-6fcee5da7ade" providerId="ADAL" clId="{17056212-C789-4D94-A224-491696FC5D6E}" dt="2023-12-12T18:46:59.259" v="3120" actId="1076"/>
+          <ac:picMkLst>
+            <pc:docMk/>
+            <pc:sldMk cId="3547871776" sldId="269"/>
+            <ac:picMk id="5" creationId="{B0F90A88-2372-3D69-96D2-BB8F636DDE9E}"/>
+          </ac:picMkLst>
+        </pc:picChg>
         <pc:picChg chg="add mod">
-          <ac:chgData name="ignazio emanuele picciche'" userId="0ffc6f3f-5a1e-4bcf-8207-6fcee5da7ade" providerId="ADAL" clId="{17056212-C789-4D94-A224-491696FC5D6E}" dt="2023-12-11T21:32:27.368" v="2920"/>
+          <ac:chgData name="ignazio emanuele picciche'" userId="0ffc6f3f-5a1e-4bcf-8207-6fcee5da7ade" providerId="ADAL" clId="{17056212-C789-4D94-A224-491696FC5D6E}" dt="2023-12-12T18:47:29.343" v="3127" actId="1076"/>
           <ac:picMkLst>
             <pc:docMk/>
             <pc:sldMk cId="3547871776" sldId="269"/>
@@ -2992,6 +3061,161 @@
           <pc:docMk/>
           <pc:sldMk cId="945971025" sldId="272"/>
         </pc:sldMkLst>
+      </pc:sldChg>
+      <pc:sldChg chg="addSp delSp modSp add mod">
+        <pc:chgData name="ignazio emanuele picciche'" userId="0ffc6f3f-5a1e-4bcf-8207-6fcee5da7ade" providerId="ADAL" clId="{17056212-C789-4D94-A224-491696FC5D6E}" dt="2023-12-12T19:07:50.086" v="3299" actId="1076"/>
+        <pc:sldMkLst>
+          <pc:docMk/>
+          <pc:sldMk cId="2244210577" sldId="273"/>
+        </pc:sldMkLst>
+        <pc:spChg chg="add del mod">
+          <ac:chgData name="ignazio emanuele picciche'" userId="0ffc6f3f-5a1e-4bcf-8207-6fcee5da7ade" providerId="ADAL" clId="{17056212-C789-4D94-A224-491696FC5D6E}" dt="2023-12-12T19:07:30.671" v="3276" actId="478"/>
+          <ac:spMkLst>
+            <pc:docMk/>
+            <pc:sldMk cId="2244210577" sldId="273"/>
+            <ac:spMk id="6" creationId="{55E43CD7-8658-0794-9438-CE9B27FDBAB7}"/>
+          </ac:spMkLst>
+        </pc:spChg>
+        <pc:spChg chg="add del mod">
+          <ac:chgData name="ignazio emanuele picciche'" userId="0ffc6f3f-5a1e-4bcf-8207-6fcee5da7ade" providerId="ADAL" clId="{17056212-C789-4D94-A224-491696FC5D6E}" dt="2023-12-12T19:07:27.121" v="3275"/>
+          <ac:spMkLst>
+            <pc:docMk/>
+            <pc:sldMk cId="2244210577" sldId="273"/>
+            <ac:spMk id="7" creationId="{AC037EA0-2811-6164-E495-2BDF308AC99A}"/>
+          </ac:spMkLst>
+        </pc:spChg>
+        <pc:spChg chg="add mod">
+          <ac:chgData name="ignazio emanuele picciche'" userId="0ffc6f3f-5a1e-4bcf-8207-6fcee5da7ade" providerId="ADAL" clId="{17056212-C789-4D94-A224-491696FC5D6E}" dt="2023-12-12T19:07:41.633" v="3297" actId="20577"/>
+          <ac:spMkLst>
+            <pc:docMk/>
+            <pc:sldMk cId="2244210577" sldId="273"/>
+            <ac:spMk id="8" creationId="{434CCB4D-254C-EBDE-2463-AB1821253B50}"/>
+          </ac:spMkLst>
+        </pc:spChg>
+        <pc:picChg chg="del">
+          <ac:chgData name="ignazio emanuele picciche'" userId="0ffc6f3f-5a1e-4bcf-8207-6fcee5da7ade" providerId="ADAL" clId="{17056212-C789-4D94-A224-491696FC5D6E}" dt="2023-12-12T19:03:28.852" v="3144" actId="478"/>
+          <ac:picMkLst>
+            <pc:docMk/>
+            <pc:sldMk cId="2244210577" sldId="273"/>
+            <ac:picMk id="3" creationId="{B9A28941-61E9-8009-E174-BEFAAA40B32C}"/>
+          </ac:picMkLst>
+        </pc:picChg>
+        <pc:picChg chg="add mod">
+          <ac:chgData name="ignazio emanuele picciche'" userId="0ffc6f3f-5a1e-4bcf-8207-6fcee5da7ade" providerId="ADAL" clId="{17056212-C789-4D94-A224-491696FC5D6E}" dt="2023-12-12T19:07:50.086" v="3299" actId="1076"/>
+          <ac:picMkLst>
+            <pc:docMk/>
+            <pc:sldMk cId="2244210577" sldId="273"/>
+            <ac:picMk id="4" creationId="{988E12BF-A4F6-3D79-2BA3-DB9629177034}"/>
+          </ac:picMkLst>
+        </pc:picChg>
+      </pc:sldChg>
+      <pc:sldChg chg="add">
+        <pc:chgData name="ignazio emanuele picciche'" userId="0ffc6f3f-5a1e-4bcf-8207-6fcee5da7ade" providerId="ADAL" clId="{17056212-C789-4D94-A224-491696FC5D6E}" dt="2023-12-12T19:03:32.985" v="3145" actId="2890"/>
+        <pc:sldMkLst>
+          <pc:docMk/>
+          <pc:sldMk cId="299009378" sldId="274"/>
+        </pc:sldMkLst>
+      </pc:sldChg>
+      <pc:sldChg chg="addSp delSp modSp add mod">
+        <pc:chgData name="ignazio emanuele picciche'" userId="0ffc6f3f-5a1e-4bcf-8207-6fcee5da7ade" providerId="ADAL" clId="{17056212-C789-4D94-A224-491696FC5D6E}" dt="2023-12-12T19:10:02.515" v="3320" actId="20577"/>
+        <pc:sldMkLst>
+          <pc:docMk/>
+          <pc:sldMk cId="178657401" sldId="275"/>
+        </pc:sldMkLst>
+        <pc:spChg chg="mod">
+          <ac:chgData name="ignazio emanuele picciche'" userId="0ffc6f3f-5a1e-4bcf-8207-6fcee5da7ade" providerId="ADAL" clId="{17056212-C789-4D94-A224-491696FC5D6E}" dt="2023-12-12T19:10:02.515" v="3320" actId="20577"/>
+          <ac:spMkLst>
+            <pc:docMk/>
+            <pc:sldMk cId="178657401" sldId="275"/>
+            <ac:spMk id="8" creationId="{434CCB4D-254C-EBDE-2463-AB1821253B50}"/>
+          </ac:spMkLst>
+        </pc:spChg>
+        <pc:picChg chg="add mod">
+          <ac:chgData name="ignazio emanuele picciche'" userId="0ffc6f3f-5a1e-4bcf-8207-6fcee5da7ade" providerId="ADAL" clId="{17056212-C789-4D94-A224-491696FC5D6E}" dt="2023-12-12T19:09:47.304" v="3305" actId="1076"/>
+          <ac:picMkLst>
+            <pc:docMk/>
+            <pc:sldMk cId="178657401" sldId="275"/>
+            <ac:picMk id="3" creationId="{C00DA293-7693-55DB-A8FD-BEFA994FA363}"/>
+          </ac:picMkLst>
+        </pc:picChg>
+        <pc:picChg chg="del">
+          <ac:chgData name="ignazio emanuele picciche'" userId="0ffc6f3f-5a1e-4bcf-8207-6fcee5da7ade" providerId="ADAL" clId="{17056212-C789-4D94-A224-491696FC5D6E}" dt="2023-12-12T19:07:57.990" v="3301" actId="478"/>
+          <ac:picMkLst>
+            <pc:docMk/>
+            <pc:sldMk cId="178657401" sldId="275"/>
+            <ac:picMk id="4" creationId="{988E12BF-A4F6-3D79-2BA3-DB9629177034}"/>
+          </ac:picMkLst>
+        </pc:picChg>
+      </pc:sldChg>
+      <pc:sldChg chg="addSp delSp modSp add mod">
+        <pc:chgData name="ignazio emanuele picciche'" userId="0ffc6f3f-5a1e-4bcf-8207-6fcee5da7ade" providerId="ADAL" clId="{17056212-C789-4D94-A224-491696FC5D6E}" dt="2023-12-12T19:20:23.664" v="3400" actId="14100"/>
+        <pc:sldMkLst>
+          <pc:docMk/>
+          <pc:sldMk cId="2940858589" sldId="276"/>
+        </pc:sldMkLst>
+        <pc:spChg chg="mod">
+          <ac:chgData name="ignazio emanuele picciche'" userId="0ffc6f3f-5a1e-4bcf-8207-6fcee5da7ade" providerId="ADAL" clId="{17056212-C789-4D94-A224-491696FC5D6E}" dt="2023-12-12T19:14:57.023" v="3368" actId="20577"/>
+          <ac:spMkLst>
+            <pc:docMk/>
+            <pc:sldMk cId="2940858589" sldId="276"/>
+            <ac:spMk id="8" creationId="{434CCB4D-254C-EBDE-2463-AB1821253B50}"/>
+          </ac:spMkLst>
+        </pc:spChg>
+        <pc:picChg chg="del">
+          <ac:chgData name="ignazio emanuele picciche'" userId="0ffc6f3f-5a1e-4bcf-8207-6fcee5da7ade" providerId="ADAL" clId="{17056212-C789-4D94-A224-491696FC5D6E}" dt="2023-12-12T19:10:28.698" v="3322" actId="478"/>
+          <ac:picMkLst>
+            <pc:docMk/>
+            <pc:sldMk cId="2940858589" sldId="276"/>
+            <ac:picMk id="3" creationId="{C00DA293-7693-55DB-A8FD-BEFA994FA363}"/>
+          </ac:picMkLst>
+        </pc:picChg>
+        <pc:picChg chg="add del mod">
+          <ac:chgData name="ignazio emanuele picciche'" userId="0ffc6f3f-5a1e-4bcf-8207-6fcee5da7ade" providerId="ADAL" clId="{17056212-C789-4D94-A224-491696FC5D6E}" dt="2023-12-12T19:20:07.220" v="3396" actId="478"/>
+          <ac:picMkLst>
+            <pc:docMk/>
+            <pc:sldMk cId="2940858589" sldId="276"/>
+            <ac:picMk id="4" creationId="{101E7565-1C55-28C8-6469-79F6579D669C}"/>
+          </ac:picMkLst>
+        </pc:picChg>
+        <pc:picChg chg="add mod">
+          <ac:chgData name="ignazio emanuele picciche'" userId="0ffc6f3f-5a1e-4bcf-8207-6fcee5da7ade" providerId="ADAL" clId="{17056212-C789-4D94-A224-491696FC5D6E}" dt="2023-12-12T19:20:23.664" v="3400" actId="14100"/>
+          <ac:picMkLst>
+            <pc:docMk/>
+            <pc:sldMk cId="2940858589" sldId="276"/>
+            <ac:picMk id="7" creationId="{ACDFA5FA-6E76-E836-C182-FBC2E0355CD3}"/>
+          </ac:picMkLst>
+        </pc:picChg>
+      </pc:sldChg>
+      <pc:sldChg chg="addSp delSp modSp add mod">
+        <pc:chgData name="ignazio emanuele picciche'" userId="0ffc6f3f-5a1e-4bcf-8207-6fcee5da7ade" providerId="ADAL" clId="{17056212-C789-4D94-A224-491696FC5D6E}" dt="2023-12-12T19:19:14.764" v="3395" actId="1076"/>
+        <pc:sldMkLst>
+          <pc:docMk/>
+          <pc:sldMk cId="1112807895" sldId="277"/>
+        </pc:sldMkLst>
+        <pc:spChg chg="mod">
+          <ac:chgData name="ignazio emanuele picciche'" userId="0ffc6f3f-5a1e-4bcf-8207-6fcee5da7ade" providerId="ADAL" clId="{17056212-C789-4D94-A224-491696FC5D6E}" dt="2023-12-12T19:15:15.977" v="3388" actId="20577"/>
+          <ac:spMkLst>
+            <pc:docMk/>
+            <pc:sldMk cId="1112807895" sldId="277"/>
+            <ac:spMk id="8" creationId="{434CCB4D-254C-EBDE-2463-AB1821253B50}"/>
+          </ac:spMkLst>
+        </pc:spChg>
+        <pc:picChg chg="add mod">
+          <ac:chgData name="ignazio emanuele picciche'" userId="0ffc6f3f-5a1e-4bcf-8207-6fcee5da7ade" providerId="ADAL" clId="{17056212-C789-4D94-A224-491696FC5D6E}" dt="2023-12-12T19:19:14.764" v="3395" actId="1076"/>
+          <ac:picMkLst>
+            <pc:docMk/>
+            <pc:sldMk cId="1112807895" sldId="277"/>
+            <ac:picMk id="3" creationId="{C22C0336-A48B-FDC5-442E-8A35C27030F4}"/>
+          </ac:picMkLst>
+        </pc:picChg>
+        <pc:picChg chg="del">
+          <ac:chgData name="ignazio emanuele picciche'" userId="0ffc6f3f-5a1e-4bcf-8207-6fcee5da7ade" providerId="ADAL" clId="{17056212-C789-4D94-A224-491696FC5D6E}" dt="2023-12-12T19:15:06.139" v="3370" actId="478"/>
+          <ac:picMkLst>
+            <pc:docMk/>
+            <pc:sldMk cId="1112807895" sldId="277"/>
+            <ac:picMk id="4" creationId="{101E7565-1C55-28C8-6469-79F6579D669C}"/>
+          </ac:picMkLst>
+        </pc:picChg>
       </pc:sldChg>
     </pc:docChg>
   </pc:docChgLst>
@@ -3239,7 +3463,7 @@
           <a:p>
             <a:fld id="{21590A60-A07C-46F9-8B65-B35F273389B3}" type="slidenum">
               <a:rPr lang="en-GB" smtClean="0"/>
-              <a:t>‹N›</a:t>
+              <a:t>‹#›</a:t>
             </a:fld>
             <a:endParaRPr lang="en-GB"/>
           </a:p>
@@ -3674,7 +3898,7 @@
     </p:spTree>
     <p:extLst>
       <p:ext uri="{BB962C8B-B14F-4D97-AF65-F5344CB8AC3E}">
-        <p14:creationId xmlns:p14="http://schemas.microsoft.com/office/powerpoint/2010/main" val="2710309120"/>
+        <p14:creationId xmlns:p14="http://schemas.microsoft.com/office/powerpoint/2010/main" val="558322348"/>
       </p:ext>
     </p:extLst>
   </p:cSld>
@@ -3750,6 +3974,426 @@
             <a:fld id="{21590A60-A07C-46F9-8B65-B35F273389B3}" type="slidenum">
               <a:rPr lang="en-GB" smtClean="0"/>
               <a:t>16</a:t>
+            </a:fld>
+            <a:endParaRPr lang="en-GB"/>
+          </a:p>
+        </p:txBody>
+      </p:sp>
+    </p:spTree>
+    <p:extLst>
+      <p:ext uri="{BB962C8B-B14F-4D97-AF65-F5344CB8AC3E}">
+        <p14:creationId xmlns:p14="http://schemas.microsoft.com/office/powerpoint/2010/main" val="1168927959"/>
+      </p:ext>
+    </p:extLst>
+  </p:cSld>
+  <p:clrMapOvr>
+    <a:masterClrMapping/>
+  </p:clrMapOvr>
+</p:notes>
+</file>
+
+<file path=ppt/notesSlides/notesSlide14.xml><?xml version="1.0" encoding="utf-8"?>
+<p:notes xmlns:a="http://schemas.openxmlformats.org/drawingml/2006/main" xmlns:r="http://schemas.openxmlformats.org/officeDocument/2006/relationships" xmlns:p="http://schemas.openxmlformats.org/presentationml/2006/main">
+  <p:cSld>
+    <p:spTree>
+      <p:nvGrpSpPr>
+        <p:cNvPr id="1" name=""/>
+        <p:cNvGrpSpPr/>
+        <p:nvPr/>
+      </p:nvGrpSpPr>
+      <p:grpSpPr>
+        <a:xfrm>
+          <a:off x="0" y="0"/>
+          <a:ext cx="0" cy="0"/>
+          <a:chOff x="0" y="0"/>
+          <a:chExt cx="0" cy="0"/>
+        </a:xfrm>
+      </p:grpSpPr>
+      <p:sp>
+        <p:nvSpPr>
+          <p:cNvPr id="2" name="Slide Image Placeholder 1"/>
+          <p:cNvSpPr>
+            <a:spLocks noGrp="1" noRot="1" noChangeAspect="1"/>
+          </p:cNvSpPr>
+          <p:nvPr>
+            <p:ph type="sldImg"/>
+          </p:nvPr>
+        </p:nvSpPr>
+        <p:spPr/>
+      </p:sp>
+      <p:sp>
+        <p:nvSpPr>
+          <p:cNvPr id="3" name="Notes Placeholder 2"/>
+          <p:cNvSpPr>
+            <a:spLocks noGrp="1"/>
+          </p:cNvSpPr>
+          <p:nvPr>
+            <p:ph type="body" idx="1"/>
+          </p:nvPr>
+        </p:nvSpPr>
+        <p:spPr/>
+        <p:txBody>
+          <a:bodyPr/>
+          <a:lstStyle/>
+          <a:p>
+            <a:endParaRPr lang="en-GB" dirty="0"/>
+          </a:p>
+        </p:txBody>
+      </p:sp>
+      <p:sp>
+        <p:nvSpPr>
+          <p:cNvPr id="4" name="Slide Number Placeholder 3"/>
+          <p:cNvSpPr>
+            <a:spLocks noGrp="1"/>
+          </p:cNvSpPr>
+          <p:nvPr>
+            <p:ph type="sldNum" sz="quarter" idx="5"/>
+          </p:nvPr>
+        </p:nvSpPr>
+        <p:spPr/>
+        <p:txBody>
+          <a:bodyPr/>
+          <a:lstStyle/>
+          <a:p>
+            <a:fld id="{21590A60-A07C-46F9-8B65-B35F273389B3}" type="slidenum">
+              <a:rPr lang="en-GB" smtClean="0"/>
+              <a:t>17</a:t>
+            </a:fld>
+            <a:endParaRPr lang="en-GB"/>
+          </a:p>
+        </p:txBody>
+      </p:sp>
+    </p:spTree>
+    <p:extLst>
+      <p:ext uri="{BB962C8B-B14F-4D97-AF65-F5344CB8AC3E}">
+        <p14:creationId xmlns:p14="http://schemas.microsoft.com/office/powerpoint/2010/main" val="2477077379"/>
+      </p:ext>
+    </p:extLst>
+  </p:cSld>
+  <p:clrMapOvr>
+    <a:masterClrMapping/>
+  </p:clrMapOvr>
+</p:notes>
+</file>
+
+<file path=ppt/notesSlides/notesSlide15.xml><?xml version="1.0" encoding="utf-8"?>
+<p:notes xmlns:a="http://schemas.openxmlformats.org/drawingml/2006/main" xmlns:r="http://schemas.openxmlformats.org/officeDocument/2006/relationships" xmlns:p="http://schemas.openxmlformats.org/presentationml/2006/main">
+  <p:cSld>
+    <p:spTree>
+      <p:nvGrpSpPr>
+        <p:cNvPr id="1" name=""/>
+        <p:cNvGrpSpPr/>
+        <p:nvPr/>
+      </p:nvGrpSpPr>
+      <p:grpSpPr>
+        <a:xfrm>
+          <a:off x="0" y="0"/>
+          <a:ext cx="0" cy="0"/>
+          <a:chOff x="0" y="0"/>
+          <a:chExt cx="0" cy="0"/>
+        </a:xfrm>
+      </p:grpSpPr>
+      <p:sp>
+        <p:nvSpPr>
+          <p:cNvPr id="2" name="Slide Image Placeholder 1"/>
+          <p:cNvSpPr>
+            <a:spLocks noGrp="1" noRot="1" noChangeAspect="1"/>
+          </p:cNvSpPr>
+          <p:nvPr>
+            <p:ph type="sldImg"/>
+          </p:nvPr>
+        </p:nvSpPr>
+        <p:spPr/>
+      </p:sp>
+      <p:sp>
+        <p:nvSpPr>
+          <p:cNvPr id="3" name="Notes Placeholder 2"/>
+          <p:cNvSpPr>
+            <a:spLocks noGrp="1"/>
+          </p:cNvSpPr>
+          <p:nvPr>
+            <p:ph type="body" idx="1"/>
+          </p:nvPr>
+        </p:nvSpPr>
+        <p:spPr/>
+        <p:txBody>
+          <a:bodyPr/>
+          <a:lstStyle/>
+          <a:p>
+            <a:endParaRPr lang="en-GB" dirty="0"/>
+          </a:p>
+        </p:txBody>
+      </p:sp>
+      <p:sp>
+        <p:nvSpPr>
+          <p:cNvPr id="4" name="Slide Number Placeholder 3"/>
+          <p:cNvSpPr>
+            <a:spLocks noGrp="1"/>
+          </p:cNvSpPr>
+          <p:nvPr>
+            <p:ph type="sldNum" sz="quarter" idx="5"/>
+          </p:nvPr>
+        </p:nvSpPr>
+        <p:spPr/>
+        <p:txBody>
+          <a:bodyPr/>
+          <a:lstStyle/>
+          <a:p>
+            <a:fld id="{21590A60-A07C-46F9-8B65-B35F273389B3}" type="slidenum">
+              <a:rPr lang="en-GB" smtClean="0"/>
+              <a:t>18</a:t>
+            </a:fld>
+            <a:endParaRPr lang="en-GB"/>
+          </a:p>
+        </p:txBody>
+      </p:sp>
+    </p:spTree>
+    <p:extLst>
+      <p:ext uri="{BB962C8B-B14F-4D97-AF65-F5344CB8AC3E}">
+        <p14:creationId xmlns:p14="http://schemas.microsoft.com/office/powerpoint/2010/main" val="2387850727"/>
+      </p:ext>
+    </p:extLst>
+  </p:cSld>
+  <p:clrMapOvr>
+    <a:masterClrMapping/>
+  </p:clrMapOvr>
+</p:notes>
+</file>
+
+<file path=ppt/notesSlides/notesSlide16.xml><?xml version="1.0" encoding="utf-8"?>
+<p:notes xmlns:a="http://schemas.openxmlformats.org/drawingml/2006/main" xmlns:r="http://schemas.openxmlformats.org/officeDocument/2006/relationships" xmlns:p="http://schemas.openxmlformats.org/presentationml/2006/main">
+  <p:cSld>
+    <p:spTree>
+      <p:nvGrpSpPr>
+        <p:cNvPr id="1" name=""/>
+        <p:cNvGrpSpPr/>
+        <p:nvPr/>
+      </p:nvGrpSpPr>
+      <p:grpSpPr>
+        <a:xfrm>
+          <a:off x="0" y="0"/>
+          <a:ext cx="0" cy="0"/>
+          <a:chOff x="0" y="0"/>
+          <a:chExt cx="0" cy="0"/>
+        </a:xfrm>
+      </p:grpSpPr>
+      <p:sp>
+        <p:nvSpPr>
+          <p:cNvPr id="2" name="Slide Image Placeholder 1"/>
+          <p:cNvSpPr>
+            <a:spLocks noGrp="1" noRot="1" noChangeAspect="1"/>
+          </p:cNvSpPr>
+          <p:nvPr>
+            <p:ph type="sldImg"/>
+          </p:nvPr>
+        </p:nvSpPr>
+        <p:spPr/>
+      </p:sp>
+      <p:sp>
+        <p:nvSpPr>
+          <p:cNvPr id="3" name="Notes Placeholder 2"/>
+          <p:cNvSpPr>
+            <a:spLocks noGrp="1"/>
+          </p:cNvSpPr>
+          <p:nvPr>
+            <p:ph type="body" idx="1"/>
+          </p:nvPr>
+        </p:nvSpPr>
+        <p:spPr/>
+        <p:txBody>
+          <a:bodyPr/>
+          <a:lstStyle/>
+          <a:p>
+            <a:endParaRPr lang="en-GB" dirty="0"/>
+          </a:p>
+        </p:txBody>
+      </p:sp>
+      <p:sp>
+        <p:nvSpPr>
+          <p:cNvPr id="4" name="Slide Number Placeholder 3"/>
+          <p:cNvSpPr>
+            <a:spLocks noGrp="1"/>
+          </p:cNvSpPr>
+          <p:nvPr>
+            <p:ph type="sldNum" sz="quarter" idx="5"/>
+          </p:nvPr>
+        </p:nvSpPr>
+        <p:spPr/>
+        <p:txBody>
+          <a:bodyPr/>
+          <a:lstStyle/>
+          <a:p>
+            <a:fld id="{21590A60-A07C-46F9-8B65-B35F273389B3}" type="slidenum">
+              <a:rPr lang="en-GB" smtClean="0"/>
+              <a:t>19</a:t>
+            </a:fld>
+            <a:endParaRPr lang="en-GB"/>
+          </a:p>
+        </p:txBody>
+      </p:sp>
+    </p:spTree>
+    <p:extLst>
+      <p:ext uri="{BB962C8B-B14F-4D97-AF65-F5344CB8AC3E}">
+        <p14:creationId xmlns:p14="http://schemas.microsoft.com/office/powerpoint/2010/main" val="878146333"/>
+      </p:ext>
+    </p:extLst>
+  </p:cSld>
+  <p:clrMapOvr>
+    <a:masterClrMapping/>
+  </p:clrMapOvr>
+</p:notes>
+</file>
+
+<file path=ppt/notesSlides/notesSlide17.xml><?xml version="1.0" encoding="utf-8"?>
+<p:notes xmlns:a="http://schemas.openxmlformats.org/drawingml/2006/main" xmlns:r="http://schemas.openxmlformats.org/officeDocument/2006/relationships" xmlns:p="http://schemas.openxmlformats.org/presentationml/2006/main">
+  <p:cSld>
+    <p:spTree>
+      <p:nvGrpSpPr>
+        <p:cNvPr id="1" name=""/>
+        <p:cNvGrpSpPr/>
+        <p:nvPr/>
+      </p:nvGrpSpPr>
+      <p:grpSpPr>
+        <a:xfrm>
+          <a:off x="0" y="0"/>
+          <a:ext cx="0" cy="0"/>
+          <a:chOff x="0" y="0"/>
+          <a:chExt cx="0" cy="0"/>
+        </a:xfrm>
+      </p:grpSpPr>
+      <p:sp>
+        <p:nvSpPr>
+          <p:cNvPr id="2" name="Slide Image Placeholder 1"/>
+          <p:cNvSpPr>
+            <a:spLocks noGrp="1" noRot="1" noChangeAspect="1"/>
+          </p:cNvSpPr>
+          <p:nvPr>
+            <p:ph type="sldImg"/>
+          </p:nvPr>
+        </p:nvSpPr>
+        <p:spPr/>
+      </p:sp>
+      <p:sp>
+        <p:nvSpPr>
+          <p:cNvPr id="3" name="Notes Placeholder 2"/>
+          <p:cNvSpPr>
+            <a:spLocks noGrp="1"/>
+          </p:cNvSpPr>
+          <p:nvPr>
+            <p:ph type="body" idx="1"/>
+          </p:nvPr>
+        </p:nvSpPr>
+        <p:spPr/>
+        <p:txBody>
+          <a:bodyPr/>
+          <a:lstStyle/>
+          <a:p>
+            <a:endParaRPr lang="en-GB" dirty="0"/>
+          </a:p>
+        </p:txBody>
+      </p:sp>
+      <p:sp>
+        <p:nvSpPr>
+          <p:cNvPr id="4" name="Slide Number Placeholder 3"/>
+          <p:cNvSpPr>
+            <a:spLocks noGrp="1"/>
+          </p:cNvSpPr>
+          <p:nvPr>
+            <p:ph type="sldNum" sz="quarter" idx="5"/>
+          </p:nvPr>
+        </p:nvSpPr>
+        <p:spPr/>
+        <p:txBody>
+          <a:bodyPr/>
+          <a:lstStyle/>
+          <a:p>
+            <a:fld id="{21590A60-A07C-46F9-8B65-B35F273389B3}" type="slidenum">
+              <a:rPr lang="en-GB" smtClean="0"/>
+              <a:t>20</a:t>
+            </a:fld>
+            <a:endParaRPr lang="en-GB"/>
+          </a:p>
+        </p:txBody>
+      </p:sp>
+    </p:spTree>
+    <p:extLst>
+      <p:ext uri="{BB962C8B-B14F-4D97-AF65-F5344CB8AC3E}">
+        <p14:creationId xmlns:p14="http://schemas.microsoft.com/office/powerpoint/2010/main" val="2710309120"/>
+      </p:ext>
+    </p:extLst>
+  </p:cSld>
+  <p:clrMapOvr>
+    <a:masterClrMapping/>
+  </p:clrMapOvr>
+</p:notes>
+</file>
+
+<file path=ppt/notesSlides/notesSlide18.xml><?xml version="1.0" encoding="utf-8"?>
+<p:notes xmlns:a="http://schemas.openxmlformats.org/drawingml/2006/main" xmlns:r="http://schemas.openxmlformats.org/officeDocument/2006/relationships" xmlns:p="http://schemas.openxmlformats.org/presentationml/2006/main">
+  <p:cSld>
+    <p:spTree>
+      <p:nvGrpSpPr>
+        <p:cNvPr id="1" name=""/>
+        <p:cNvGrpSpPr/>
+        <p:nvPr/>
+      </p:nvGrpSpPr>
+      <p:grpSpPr>
+        <a:xfrm>
+          <a:off x="0" y="0"/>
+          <a:ext cx="0" cy="0"/>
+          <a:chOff x="0" y="0"/>
+          <a:chExt cx="0" cy="0"/>
+        </a:xfrm>
+      </p:grpSpPr>
+      <p:sp>
+        <p:nvSpPr>
+          <p:cNvPr id="2" name="Slide Image Placeholder 1"/>
+          <p:cNvSpPr>
+            <a:spLocks noGrp="1" noRot="1" noChangeAspect="1"/>
+          </p:cNvSpPr>
+          <p:nvPr>
+            <p:ph type="sldImg"/>
+          </p:nvPr>
+        </p:nvSpPr>
+        <p:spPr/>
+      </p:sp>
+      <p:sp>
+        <p:nvSpPr>
+          <p:cNvPr id="3" name="Notes Placeholder 2"/>
+          <p:cNvSpPr>
+            <a:spLocks noGrp="1"/>
+          </p:cNvSpPr>
+          <p:nvPr>
+            <p:ph type="body" idx="1"/>
+          </p:nvPr>
+        </p:nvSpPr>
+        <p:spPr/>
+        <p:txBody>
+          <a:bodyPr/>
+          <a:lstStyle/>
+          <a:p>
+            <a:endParaRPr lang="en-GB" dirty="0"/>
+          </a:p>
+        </p:txBody>
+      </p:sp>
+      <p:sp>
+        <p:nvSpPr>
+          <p:cNvPr id="4" name="Slide Number Placeholder 3"/>
+          <p:cNvSpPr>
+            <a:spLocks noGrp="1"/>
+          </p:cNvSpPr>
+          <p:nvPr>
+            <p:ph type="sldNum" sz="quarter" idx="5"/>
+          </p:nvPr>
+        </p:nvSpPr>
+        <p:spPr/>
+        <p:txBody>
+          <a:bodyPr/>
+          <a:lstStyle/>
+          <a:p>
+            <a:fld id="{21590A60-A07C-46F9-8B65-B35F273389B3}" type="slidenum">
+              <a:rPr lang="en-GB" smtClean="0"/>
+              <a:t>21</a:t>
             </a:fld>
             <a:endParaRPr lang="en-GB"/>
           </a:p>
@@ -4643,7 +5287,7 @@
           <a:p>
             <a:fld id="{FEFDB88F-100D-4711-A891-FAA8E52A6A31}" type="slidenum">
               <a:rPr lang="en-GB" smtClean="0"/>
-              <a:t>‹N›</a:t>
+              <a:t>‹#›</a:t>
             </a:fld>
             <a:endParaRPr lang="en-GB"/>
           </a:p>
@@ -4843,7 +5487,7 @@
           <a:p>
             <a:fld id="{FEFDB88F-100D-4711-A891-FAA8E52A6A31}" type="slidenum">
               <a:rPr lang="en-GB" smtClean="0"/>
-              <a:t>‹N›</a:t>
+              <a:t>‹#›</a:t>
             </a:fld>
             <a:endParaRPr lang="en-GB"/>
           </a:p>
@@ -5053,7 +5697,7 @@
           <a:p>
             <a:fld id="{FEFDB88F-100D-4711-A891-FAA8E52A6A31}" type="slidenum">
               <a:rPr lang="en-GB" smtClean="0"/>
-              <a:t>‹N›</a:t>
+              <a:t>‹#›</a:t>
             </a:fld>
             <a:endParaRPr lang="en-GB"/>
           </a:p>
@@ -5253,7 +5897,7 @@
           <a:p>
             <a:fld id="{FEFDB88F-100D-4711-A891-FAA8E52A6A31}" type="slidenum">
               <a:rPr lang="en-GB" smtClean="0"/>
-              <a:t>‹N›</a:t>
+              <a:t>‹#›</a:t>
             </a:fld>
             <a:endParaRPr lang="en-GB"/>
           </a:p>
@@ -5529,7 +6173,7 @@
           <a:p>
             <a:fld id="{FEFDB88F-100D-4711-A891-FAA8E52A6A31}" type="slidenum">
               <a:rPr lang="en-GB" smtClean="0"/>
-              <a:t>‹N›</a:t>
+              <a:t>‹#›</a:t>
             </a:fld>
             <a:endParaRPr lang="en-GB"/>
           </a:p>
@@ -5797,7 +6441,7 @@
           <a:p>
             <a:fld id="{FEFDB88F-100D-4711-A891-FAA8E52A6A31}" type="slidenum">
               <a:rPr lang="en-GB" smtClean="0"/>
-              <a:t>‹N›</a:t>
+              <a:t>‹#›</a:t>
             </a:fld>
             <a:endParaRPr lang="en-GB"/>
           </a:p>
@@ -6212,7 +6856,7 @@
           <a:p>
             <a:fld id="{FEFDB88F-100D-4711-A891-FAA8E52A6A31}" type="slidenum">
               <a:rPr lang="en-GB" smtClean="0"/>
-              <a:t>‹N›</a:t>
+              <a:t>‹#›</a:t>
             </a:fld>
             <a:endParaRPr lang="en-GB"/>
           </a:p>
@@ -6354,7 +6998,7 @@
           <a:p>
             <a:fld id="{FEFDB88F-100D-4711-A891-FAA8E52A6A31}" type="slidenum">
               <a:rPr lang="en-GB" smtClean="0"/>
-              <a:t>‹N›</a:t>
+              <a:t>‹#›</a:t>
             </a:fld>
             <a:endParaRPr lang="en-GB"/>
           </a:p>
@@ -6467,7 +7111,7 @@
           <a:p>
             <a:fld id="{FEFDB88F-100D-4711-A891-FAA8E52A6A31}" type="slidenum">
               <a:rPr lang="en-GB" smtClean="0"/>
-              <a:t>‹N›</a:t>
+              <a:t>‹#›</a:t>
             </a:fld>
             <a:endParaRPr lang="en-GB"/>
           </a:p>
@@ -6780,7 +7424,7 @@
           <a:p>
             <a:fld id="{FEFDB88F-100D-4711-A891-FAA8E52A6A31}" type="slidenum">
               <a:rPr lang="en-GB" smtClean="0"/>
-              <a:t>‹N›</a:t>
+              <a:t>‹#›</a:t>
             </a:fld>
             <a:endParaRPr lang="en-GB"/>
           </a:p>
@@ -7069,7 +7713,7 @@
           <a:p>
             <a:fld id="{FEFDB88F-100D-4711-A891-FAA8E52A6A31}" type="slidenum">
               <a:rPr lang="en-GB" smtClean="0"/>
-              <a:t>‹N›</a:t>
+              <a:t>‹#›</a:t>
             </a:fld>
             <a:endParaRPr lang="en-GB"/>
           </a:p>
@@ -7348,7 +7992,7 @@
           <a:p>
             <a:fld id="{FEFDB88F-100D-4711-A891-FAA8E52A6A31}" type="slidenum">
               <a:rPr lang="en-GB" smtClean="0"/>
-              <a:t>‹N›</a:t>
+              <a:t>‹#›</a:t>
             </a:fld>
             <a:endParaRPr lang="en-GB"/>
           </a:p>
@@ -8322,8 +8966,8 @@
         </p:nvSpPr>
         <p:spPr>
           <a:xfrm>
-            <a:off x="301733" y="5022218"/>
-            <a:ext cx="10833300" cy="1477328"/>
+            <a:off x="301732" y="5257764"/>
+            <a:ext cx="11467480" cy="1200329"/>
           </a:xfrm>
           <a:prstGeom prst="rect">
             <a:avLst/>
@@ -8717,8 +9361,8 @@
         </p:blipFill>
         <p:spPr>
           <a:xfrm>
-            <a:off x="2975070" y="1110372"/>
-            <a:ext cx="6241859" cy="3792457"/>
+            <a:off x="7186858" y="2000139"/>
+            <a:ext cx="4703410" cy="2857719"/>
           </a:xfrm>
           <a:prstGeom prst="rect">
             <a:avLst/>
@@ -9940,6 +10584,99 @@
           </a:prstGeom>
         </p:spPr>
       </p:pic>
+      <p:pic>
+        <p:nvPicPr>
+          <p:cNvPr id="3" name="Picture 2">
+            <a:extLst>
+              <a:ext uri="{FF2B5EF4-FFF2-40B4-BE49-F238E27FC236}">
+                <a16:creationId xmlns:a16="http://schemas.microsoft.com/office/drawing/2014/main" id="{B9A28941-61E9-8009-E174-BEFAAA40B32C}"/>
+              </a:ext>
+            </a:extLst>
+          </p:cNvPr>
+          <p:cNvPicPr>
+            <a:picLocks noChangeAspect="1"/>
+          </p:cNvPicPr>
+          <p:nvPr/>
+        </p:nvPicPr>
+        <p:blipFill>
+          <a:blip r:embed="rId5"/>
+          <a:stretch>
+            <a:fillRect/>
+          </a:stretch>
+        </p:blipFill>
+        <p:spPr>
+          <a:xfrm>
+            <a:off x="1362388" y="1735449"/>
+            <a:ext cx="9467223" cy="4717587"/>
+          </a:xfrm>
+          <a:prstGeom prst="rect">
+            <a:avLst/>
+          </a:prstGeom>
+        </p:spPr>
+      </p:pic>
+      <p:sp>
+        <p:nvSpPr>
+          <p:cNvPr id="4" name="TextBox 3">
+            <a:extLst>
+              <a:ext uri="{FF2B5EF4-FFF2-40B4-BE49-F238E27FC236}">
+                <a16:creationId xmlns:a16="http://schemas.microsoft.com/office/drawing/2014/main" id="{0001FB6F-5E9B-D958-E30A-9344EB18D7EB}"/>
+              </a:ext>
+            </a:extLst>
+          </p:cNvPr>
+          <p:cNvSpPr txBox="1"/>
+          <p:nvPr/>
+        </p:nvSpPr>
+        <p:spPr>
+          <a:xfrm>
+            <a:off x="301732" y="1026849"/>
+            <a:ext cx="4081758" cy="369332"/>
+          </a:xfrm>
+          <a:prstGeom prst="rect">
+            <a:avLst/>
+          </a:prstGeom>
+          <a:noFill/>
+        </p:spPr>
+        <p:txBody>
+          <a:bodyPr wrap="none" rtlCol="0">
+            <a:spAutoFit/>
+          </a:bodyPr>
+          <a:lstStyle/>
+          <a:p>
+            <a:r>
+              <a:rPr lang="en-GB" dirty="0" err="1"/>
+              <a:t>Fotografia</a:t>
+            </a:r>
+            <a:r>
+              <a:rPr lang="en-GB" dirty="0"/>
+              <a:t> </a:t>
+            </a:r>
+            <a:r>
+              <a:rPr lang="en-GB" dirty="0" err="1"/>
+              <a:t>Planetaria</a:t>
+            </a:r>
+            <a:r>
+              <a:rPr lang="en-GB" dirty="0"/>
+              <a:t> in </a:t>
+            </a:r>
+            <a:r>
+              <a:rPr lang="en-GB" dirty="0" err="1"/>
+              <a:t>buone</a:t>
+            </a:r>
+            <a:r>
+              <a:rPr lang="en-GB" dirty="0"/>
+              <a:t> </a:t>
+            </a:r>
+            <a:r>
+              <a:rPr lang="en-GB" dirty="0" err="1"/>
+              <a:t>condizioni</a:t>
+            </a:r>
+            <a:r>
+              <a:rPr lang="en-GB" dirty="0"/>
+              <a:t>.</a:t>
+            </a:r>
+          </a:p>
+        </p:txBody>
+      </p:sp>
     </p:spTree>
     <p:extLst>
       <p:ext uri="{BB962C8B-B14F-4D97-AF65-F5344CB8AC3E}">
@@ -10092,7 +10829,7 @@
         <p:spPr>
           <a:xfrm>
             <a:off x="301732" y="293576"/>
-            <a:ext cx="3456452" cy="523220"/>
+            <a:ext cx="978428" cy="523220"/>
           </a:xfrm>
           <a:prstGeom prst="rect">
             <a:avLst/>
@@ -10106,12 +10843,8 @@
           <a:lstStyle/>
           <a:p>
             <a:r>
-              <a:rPr lang="en-GB" sz="2800" b="1" dirty="0" err="1"/>
-              <a:t>Casi</a:t>
-            </a:r>
-            <a:r>
               <a:rPr lang="en-GB" sz="2800" b="1" dirty="0"/>
-              <a:t> limite</a:t>
+              <a:t>Test</a:t>
             </a:r>
           </a:p>
         </p:txBody>
@@ -10152,10 +10885,103 @@
           </a:prstGeom>
         </p:spPr>
       </p:pic>
+      <p:pic>
+        <p:nvPicPr>
+          <p:cNvPr id="4" name="Picture 3">
+            <a:extLst>
+              <a:ext uri="{FF2B5EF4-FFF2-40B4-BE49-F238E27FC236}">
+                <a16:creationId xmlns:a16="http://schemas.microsoft.com/office/drawing/2014/main" id="{988E12BF-A4F6-3D79-2BA3-DB9629177034}"/>
+              </a:ext>
+            </a:extLst>
+          </p:cNvPr>
+          <p:cNvPicPr>
+            <a:picLocks noChangeAspect="1"/>
+          </p:cNvPicPr>
+          <p:nvPr/>
+        </p:nvPicPr>
+        <p:blipFill>
+          <a:blip r:embed="rId5"/>
+          <a:stretch>
+            <a:fillRect/>
+          </a:stretch>
+        </p:blipFill>
+        <p:spPr>
+          <a:xfrm>
+            <a:off x="1266765" y="1793844"/>
+            <a:ext cx="9658470" cy="4770580"/>
+          </a:xfrm>
+          <a:prstGeom prst="rect">
+            <a:avLst/>
+          </a:prstGeom>
+        </p:spPr>
+      </p:pic>
+      <p:sp>
+        <p:nvSpPr>
+          <p:cNvPr id="8" name="TextBox 7">
+            <a:extLst>
+              <a:ext uri="{FF2B5EF4-FFF2-40B4-BE49-F238E27FC236}">
+                <a16:creationId xmlns:a16="http://schemas.microsoft.com/office/drawing/2014/main" id="{434CCB4D-254C-EBDE-2463-AB1821253B50}"/>
+              </a:ext>
+            </a:extLst>
+          </p:cNvPr>
+          <p:cNvSpPr txBox="1"/>
+          <p:nvPr/>
+        </p:nvSpPr>
+        <p:spPr>
+          <a:xfrm>
+            <a:off x="301732" y="1026849"/>
+            <a:ext cx="4233723" cy="369332"/>
+          </a:xfrm>
+          <a:prstGeom prst="rect">
+            <a:avLst/>
+          </a:prstGeom>
+          <a:noFill/>
+        </p:spPr>
+        <p:txBody>
+          <a:bodyPr wrap="none" rtlCol="0">
+            <a:spAutoFit/>
+          </a:bodyPr>
+          <a:lstStyle/>
+          <a:p>
+            <a:r>
+              <a:rPr lang="en-GB" dirty="0" err="1"/>
+              <a:t>Fotografia</a:t>
+            </a:r>
+            <a:r>
+              <a:rPr lang="en-GB" dirty="0"/>
+              <a:t> </a:t>
+            </a:r>
+            <a:r>
+              <a:rPr lang="en-GB" dirty="0" err="1"/>
+              <a:t>Planetaria</a:t>
+            </a:r>
+            <a:r>
+              <a:rPr lang="en-GB" dirty="0"/>
+              <a:t> con </a:t>
+            </a:r>
+            <a:r>
+              <a:rPr lang="en-GB" dirty="0" err="1"/>
+              <a:t>condizioni</a:t>
+            </a:r>
+            <a:r>
+              <a:rPr lang="en-GB" dirty="0"/>
+              <a:t> </a:t>
+            </a:r>
+            <a:r>
+              <a:rPr lang="en-GB" dirty="0" err="1"/>
+              <a:t>medie</a:t>
+            </a:r>
+            <a:r>
+              <a:rPr lang="en-GB" dirty="0"/>
+              <a:t>.</a:t>
+            </a:r>
+          </a:p>
+        </p:txBody>
+      </p:sp>
     </p:spTree>
     <p:extLst>
       <p:ext uri="{BB962C8B-B14F-4D97-AF65-F5344CB8AC3E}">
-        <p14:creationId xmlns:p14="http://schemas.microsoft.com/office/powerpoint/2010/main" val="1668053405"/>
+        <p14:creationId xmlns:p14="http://schemas.microsoft.com/office/powerpoint/2010/main" val="2244210577"/>
       </p:ext>
     </p:extLst>
   </p:cSld>
@@ -10289,6 +11115,41 @@
           </a:prstGeom>
         </p:spPr>
       </p:pic>
+      <p:sp>
+        <p:nvSpPr>
+          <p:cNvPr id="9" name="TextBox 8">
+            <a:extLst>
+              <a:ext uri="{FF2B5EF4-FFF2-40B4-BE49-F238E27FC236}">
+                <a16:creationId xmlns:a16="http://schemas.microsoft.com/office/drawing/2014/main" id="{7DCA9D16-5034-279C-FF1F-96C45AF4B68F}"/>
+              </a:ext>
+            </a:extLst>
+          </p:cNvPr>
+          <p:cNvSpPr txBox="1"/>
+          <p:nvPr/>
+        </p:nvSpPr>
+        <p:spPr>
+          <a:xfrm>
+            <a:off x="301732" y="293576"/>
+            <a:ext cx="978428" cy="523220"/>
+          </a:xfrm>
+          <a:prstGeom prst="rect">
+            <a:avLst/>
+          </a:prstGeom>
+          <a:noFill/>
+        </p:spPr>
+        <p:txBody>
+          <a:bodyPr wrap="square" rtlCol="0">
+            <a:spAutoFit/>
+          </a:bodyPr>
+          <a:lstStyle/>
+          <a:p>
+            <a:r>
+              <a:rPr lang="en-GB" sz="2800" b="1" dirty="0"/>
+              <a:t>Test</a:t>
+            </a:r>
+          </a:p>
+        </p:txBody>
+      </p:sp>
       <p:pic>
         <p:nvPicPr>
           <p:cNvPr id="15" name="Picture 14" descr="A blue and white logo&#10;&#10;Description automatically generated">
@@ -10327,10 +11188,10 @@
       </p:pic>
       <p:sp>
         <p:nvSpPr>
-          <p:cNvPr id="2" name="TextBox 1">
-            <a:extLst>
-              <a:ext uri="{FF2B5EF4-FFF2-40B4-BE49-F238E27FC236}">
-                <a16:creationId xmlns:a16="http://schemas.microsoft.com/office/drawing/2014/main" id="{A16A756F-7D09-52EE-CD05-3CF4139DC46D}"/>
+          <p:cNvPr id="8" name="TextBox 7">
+            <a:extLst>
+              <a:ext uri="{FF2B5EF4-FFF2-40B4-BE49-F238E27FC236}">
+                <a16:creationId xmlns:a16="http://schemas.microsoft.com/office/drawing/2014/main" id="{434CCB4D-254C-EBDE-2463-AB1821253B50}"/>
               </a:ext>
             </a:extLst>
           </p:cNvPr>
@@ -10339,8 +11200,8 @@
         </p:nvSpPr>
         <p:spPr>
           <a:xfrm>
-            <a:off x="2547817" y="2921167"/>
-            <a:ext cx="7096366" cy="1015663"/>
+            <a:off x="301732" y="1026849"/>
+            <a:ext cx="4664931" cy="369332"/>
           </a:xfrm>
           <a:prstGeom prst="rect">
             <a:avLst/>
@@ -10354,29 +11215,213 @@
           <a:lstStyle/>
           <a:p>
             <a:r>
-              <a:rPr lang="en-GB" sz="6000" b="1" dirty="0">
-                <a:latin typeface="+mj-lt"/>
-              </a:rPr>
-              <a:t>Grazie per </a:t>
-            </a:r>
-            <a:r>
-              <a:rPr lang="en-GB" sz="6000" b="1" dirty="0" err="1">
-                <a:latin typeface="+mj-lt"/>
-              </a:rPr>
-              <a:t>l’attenzione</a:t>
-            </a:r>
-            <a:endParaRPr lang="en-GB" sz="6000" b="1" dirty="0">
-              <a:latin typeface="+mj-lt"/>
-            </a:endParaRPr>
-          </a:p>
-        </p:txBody>
-      </p:sp>
-      <p:sp>
-        <p:nvSpPr>
-          <p:cNvPr id="3" name="TextBox 2">
-            <a:extLst>
-              <a:ext uri="{FF2B5EF4-FFF2-40B4-BE49-F238E27FC236}">
-                <a16:creationId xmlns:a16="http://schemas.microsoft.com/office/drawing/2014/main" id="{C9D28ED9-E95D-507E-FC43-A20B7E08E910}"/>
+              <a:rPr lang="en-GB" dirty="0" err="1"/>
+              <a:t>Fotografia</a:t>
+            </a:r>
+            <a:r>
+              <a:rPr lang="en-GB" dirty="0"/>
+              <a:t> </a:t>
+            </a:r>
+            <a:r>
+              <a:rPr lang="en-GB" dirty="0" err="1"/>
+              <a:t>Planetaria</a:t>
+            </a:r>
+            <a:r>
+              <a:rPr lang="en-GB" dirty="0"/>
+              <a:t> con </a:t>
+            </a:r>
+            <a:r>
+              <a:rPr lang="en-GB" dirty="0" err="1"/>
+              <a:t>condizioni</a:t>
+            </a:r>
+            <a:r>
+              <a:rPr lang="en-GB" dirty="0"/>
+              <a:t> non </a:t>
+            </a:r>
+            <a:r>
+              <a:rPr lang="en-GB" dirty="0" err="1"/>
+              <a:t>buone</a:t>
+            </a:r>
+            <a:r>
+              <a:rPr lang="en-GB" dirty="0"/>
+              <a:t>.</a:t>
+            </a:r>
+          </a:p>
+        </p:txBody>
+      </p:sp>
+      <p:pic>
+        <p:nvPicPr>
+          <p:cNvPr id="3" name="Picture 2">
+            <a:extLst>
+              <a:ext uri="{FF2B5EF4-FFF2-40B4-BE49-F238E27FC236}">
+                <a16:creationId xmlns:a16="http://schemas.microsoft.com/office/drawing/2014/main" id="{C00DA293-7693-55DB-A8FD-BEFA994FA363}"/>
+              </a:ext>
+            </a:extLst>
+          </p:cNvPr>
+          <p:cNvPicPr>
+            <a:picLocks noChangeAspect="1"/>
+          </p:cNvPicPr>
+          <p:nvPr/>
+        </p:nvPicPr>
+        <p:blipFill>
+          <a:blip r:embed="rId5"/>
+          <a:stretch>
+            <a:fillRect/>
+          </a:stretch>
+        </p:blipFill>
+        <p:spPr>
+          <a:xfrm>
+            <a:off x="1116763" y="1606234"/>
+            <a:ext cx="9958474" cy="4942053"/>
+          </a:xfrm>
+          <a:prstGeom prst="rect">
+            <a:avLst/>
+          </a:prstGeom>
+        </p:spPr>
+      </p:pic>
+    </p:spTree>
+    <p:extLst>
+      <p:ext uri="{BB962C8B-B14F-4D97-AF65-F5344CB8AC3E}">
+        <p14:creationId xmlns:p14="http://schemas.microsoft.com/office/powerpoint/2010/main" val="178657401"/>
+      </p:ext>
+    </p:extLst>
+  </p:cSld>
+  <p:clrMapOvr>
+    <a:overrideClrMapping bg1="dk1" tx1="lt1" bg2="dk2" tx2="lt2" accent1="accent1" accent2="accent2" accent3="accent3" accent4="accent4" accent5="accent5" accent6="accent6" hlink="hlink" folHlink="folHlink"/>
+  </p:clrMapOvr>
+</p:sld>
+</file>
+
+<file path=ppt/slides/slide17.xml><?xml version="1.0" encoding="utf-8"?>
+<p:sld xmlns:a="http://schemas.openxmlformats.org/drawingml/2006/main" xmlns:r="http://schemas.openxmlformats.org/officeDocument/2006/relationships" xmlns:p="http://schemas.openxmlformats.org/presentationml/2006/main">
+  <p:cSld>
+    <p:bg>
+      <p:bgPr>
+        <a:solidFill>
+          <a:srgbClr val="000000"/>
+        </a:solidFill>
+        <a:effectLst/>
+      </p:bgPr>
+    </p:bg>
+    <p:spTree>
+      <p:nvGrpSpPr>
+        <p:cNvPr id="1" name=""/>
+        <p:cNvGrpSpPr/>
+        <p:nvPr/>
+      </p:nvGrpSpPr>
+      <p:grpSpPr>
+        <a:xfrm>
+          <a:off x="0" y="0"/>
+          <a:ext cx="0" cy="0"/>
+          <a:chOff x="0" y="0"/>
+          <a:chExt cx="0" cy="0"/>
+        </a:xfrm>
+      </p:grpSpPr>
+      <p:sp>
+        <p:nvSpPr>
+          <p:cNvPr id="10" name="Rectangle 9">
+            <a:extLst>
+              <a:ext uri="{FF2B5EF4-FFF2-40B4-BE49-F238E27FC236}">
+                <a16:creationId xmlns:a16="http://schemas.microsoft.com/office/drawing/2014/main" id="{71B2258F-86CA-4D4D-8270-BC05FCDEBFB3}"/>
+              </a:ext>
+              <a:ext uri="{C183D7F6-B498-43B3-948B-1728B52AA6E4}">
+                <adec:decorative xmlns:adec="http://schemas.microsoft.com/office/drawing/2017/decorative" val="1"/>
+              </a:ext>
+            </a:extLst>
+          </p:cNvPr>
+          <p:cNvSpPr>
+            <a:spLocks noGrp="1" noRot="1" noChangeAspect="1" noMove="1" noResize="1" noEditPoints="1" noAdjustHandles="1" noChangeArrowheads="1" noChangeShapeType="1" noTextEdit="1"/>
+          </p:cNvSpPr>
+          <p:nvPr>
+            <p:extLst>
+              <p:ext uri="{386F3935-93C4-4BCD-93E2-E3B085C9AB24}">
+                <p16:designElem xmlns:p16="http://schemas.microsoft.com/office/powerpoint/2015/main" val="1"/>
+              </p:ext>
+            </p:extLst>
+          </p:nvPr>
+        </p:nvSpPr>
+        <p:spPr>
+          <a:xfrm>
+            <a:off x="0" y="0"/>
+            <a:ext cx="12192000" cy="6857999"/>
+          </a:xfrm>
+          <a:prstGeom prst="rect">
+            <a:avLst/>
+          </a:prstGeom>
+          <a:solidFill>
+            <a:srgbClr val="000000"/>
+          </a:solidFill>
+          <a:ln>
+            <a:noFill/>
+          </a:ln>
+        </p:spPr>
+        <p:style>
+          <a:lnRef idx="2">
+            <a:schemeClr val="accent1">
+              <a:shade val="50000"/>
+            </a:schemeClr>
+          </a:lnRef>
+          <a:fillRef idx="1">
+            <a:schemeClr val="accent1"/>
+          </a:fillRef>
+          <a:effectRef idx="0">
+            <a:schemeClr val="accent1"/>
+          </a:effectRef>
+          <a:fontRef idx="minor">
+            <a:schemeClr val="lt1"/>
+          </a:fontRef>
+        </p:style>
+        <p:txBody>
+          <a:bodyPr rtlCol="0" anchor="ctr"/>
+          <a:lstStyle/>
+          <a:p>
+            <a:pPr algn="ctr"/>
+            <a:endParaRPr lang="en-US"/>
+          </a:p>
+        </p:txBody>
+      </p:sp>
+      <p:pic>
+        <p:nvPicPr>
+          <p:cNvPr id="5" name="Picture 4" descr="A galaxy in the sky&#10;&#10;Description automatically generated with medium confidence">
+            <a:extLst>
+              <a:ext uri="{FF2B5EF4-FFF2-40B4-BE49-F238E27FC236}">
+                <a16:creationId xmlns:a16="http://schemas.microsoft.com/office/drawing/2014/main" id="{B0F90A88-2372-3D69-96D2-BB8F636DDE9E}"/>
+              </a:ext>
+            </a:extLst>
+          </p:cNvPr>
+          <p:cNvPicPr>
+            <a:picLocks noChangeAspect="1"/>
+          </p:cNvPicPr>
+          <p:nvPr/>
+        </p:nvPicPr>
+        <p:blipFill rotWithShape="1">
+          <a:blip r:embed="rId3">
+            <a:alphaModFix amt="50000"/>
+            <a:extLst>
+              <a:ext uri="{28A0092B-C50C-407E-A947-70E740481C1C}">
+                <a14:useLocalDpi xmlns:a14="http://schemas.microsoft.com/office/drawing/2010/main" val="0"/>
+              </a:ext>
+            </a:extLst>
+          </a:blip>
+          <a:srcRect/>
+          <a:stretch/>
+        </p:blipFill>
+        <p:spPr>
+          <a:xfrm>
+            <a:off x="0" y="0"/>
+            <a:ext cx="12192000" cy="6858000"/>
+          </a:xfrm>
+          <a:prstGeom prst="rect">
+            <a:avLst/>
+          </a:prstGeom>
+        </p:spPr>
+      </p:pic>
+      <p:sp>
+        <p:nvSpPr>
+          <p:cNvPr id="9" name="TextBox 8">
+            <a:extLst>
+              <a:ext uri="{FF2B5EF4-FFF2-40B4-BE49-F238E27FC236}">
+                <a16:creationId xmlns:a16="http://schemas.microsoft.com/office/drawing/2014/main" id="{7DCA9D16-5034-279C-FF1F-96C45AF4B68F}"/>
               </a:ext>
             </a:extLst>
           </p:cNvPr>
@@ -10385,8 +11430,8 @@
         </p:nvSpPr>
         <p:spPr>
           <a:xfrm>
-            <a:off x="228600" y="6350169"/>
-            <a:ext cx="5733429" cy="338554"/>
+            <a:off x="301732" y="293576"/>
+            <a:ext cx="978428" cy="523220"/>
           </a:xfrm>
           <a:prstGeom prst="rect">
             <a:avLst/>
@@ -10394,42 +11439,644 @@
           <a:noFill/>
         </p:spPr>
         <p:txBody>
+          <a:bodyPr wrap="square" rtlCol="0">
+            <a:spAutoFit/>
+          </a:bodyPr>
+          <a:lstStyle/>
+          <a:p>
+            <a:r>
+              <a:rPr lang="en-GB" sz="2800" b="1" dirty="0"/>
+              <a:t>Test</a:t>
+            </a:r>
+          </a:p>
+        </p:txBody>
+      </p:sp>
+      <p:pic>
+        <p:nvPicPr>
+          <p:cNvPr id="15" name="Picture 14" descr="A blue and white logo&#10;&#10;Description automatically generated">
+            <a:extLst>
+              <a:ext uri="{FF2B5EF4-FFF2-40B4-BE49-F238E27FC236}">
+                <a16:creationId xmlns:a16="http://schemas.microsoft.com/office/drawing/2014/main" id="{6A2D2119-B5CD-B2DE-2CB9-9300E3B94F14}"/>
+              </a:ext>
+            </a:extLst>
+          </p:cNvPr>
+          <p:cNvPicPr>
+            <a:picLocks noChangeAspect="1"/>
+          </p:cNvPicPr>
+          <p:nvPr/>
+        </p:nvPicPr>
+        <p:blipFill>
+          <a:blip r:embed="rId4">
+            <a:extLst>
+              <a:ext uri="{28A0092B-C50C-407E-A947-70E740481C1C}">
+                <a14:useLocalDpi xmlns:a14="http://schemas.microsoft.com/office/drawing/2010/main" val="0"/>
+              </a:ext>
+            </a:extLst>
+          </a:blip>
+          <a:stretch>
+            <a:fillRect/>
+          </a:stretch>
+        </p:blipFill>
+        <p:spPr>
+          <a:xfrm>
+            <a:off x="10585151" y="264938"/>
+            <a:ext cx="1305117" cy="1098396"/>
+          </a:xfrm>
+          <a:prstGeom prst="rect">
+            <a:avLst/>
+          </a:prstGeom>
+        </p:spPr>
+      </p:pic>
+      <p:sp>
+        <p:nvSpPr>
+          <p:cNvPr id="8" name="TextBox 7">
+            <a:extLst>
+              <a:ext uri="{FF2B5EF4-FFF2-40B4-BE49-F238E27FC236}">
+                <a16:creationId xmlns:a16="http://schemas.microsoft.com/office/drawing/2014/main" id="{434CCB4D-254C-EBDE-2463-AB1821253B50}"/>
+              </a:ext>
+            </a:extLst>
+          </p:cNvPr>
+          <p:cNvSpPr txBox="1"/>
+          <p:nvPr/>
+        </p:nvSpPr>
+        <p:spPr>
+          <a:xfrm>
+            <a:off x="301732" y="1026849"/>
+            <a:ext cx="3997633" cy="369332"/>
+          </a:xfrm>
+          <a:prstGeom prst="rect">
+            <a:avLst/>
+          </a:prstGeom>
+          <a:noFill/>
+        </p:spPr>
+        <p:txBody>
           <a:bodyPr wrap="none" rtlCol="0">
             <a:spAutoFit/>
           </a:bodyPr>
           <a:lstStyle/>
           <a:p>
             <a:r>
-              <a:rPr lang="en-GB" sz="1600" dirty="0" err="1"/>
-              <a:t>Autori</a:t>
-            </a:r>
-            <a:r>
-              <a:rPr lang="en-GB" sz="1600" dirty="0"/>
-              <a:t> del </a:t>
-            </a:r>
-            <a:r>
-              <a:rPr lang="en-GB" sz="1600" dirty="0" err="1"/>
-              <a:t>progetto</a:t>
-            </a:r>
-            <a:r>
-              <a:rPr lang="en-GB" sz="1600" dirty="0"/>
-              <a:t>: Riccardo </a:t>
-            </a:r>
-            <a:r>
-              <a:rPr lang="en-GB" sz="1600" dirty="0" err="1"/>
-              <a:t>Polacchi</a:t>
-            </a:r>
-            <a:r>
-              <a:rPr lang="en-GB" sz="1600" dirty="0"/>
-              <a:t> &amp; Ignazio Emanuele Piccichè</a:t>
-            </a:r>
-          </a:p>
-        </p:txBody>
-      </p:sp>
+              <a:rPr lang="en-GB" dirty="0" err="1"/>
+              <a:t>Fotografia</a:t>
+            </a:r>
+            <a:r>
+              <a:rPr lang="en-GB" dirty="0"/>
+              <a:t> Deep Sky in </a:t>
+            </a:r>
+            <a:r>
+              <a:rPr lang="en-GB" dirty="0" err="1"/>
+              <a:t>buone</a:t>
+            </a:r>
+            <a:r>
+              <a:rPr lang="en-GB" dirty="0"/>
+              <a:t> </a:t>
+            </a:r>
+            <a:r>
+              <a:rPr lang="en-GB" dirty="0" err="1"/>
+              <a:t>condizioni</a:t>
+            </a:r>
+            <a:r>
+              <a:rPr lang="en-GB" dirty="0"/>
+              <a:t>.</a:t>
+            </a:r>
+          </a:p>
+        </p:txBody>
+      </p:sp>
+      <p:pic>
+        <p:nvPicPr>
+          <p:cNvPr id="7" name="Picture 6">
+            <a:extLst>
+              <a:ext uri="{FF2B5EF4-FFF2-40B4-BE49-F238E27FC236}">
+                <a16:creationId xmlns:a16="http://schemas.microsoft.com/office/drawing/2014/main" id="{ACDFA5FA-6E76-E836-C182-FBC2E0355CD3}"/>
+              </a:ext>
+            </a:extLst>
+          </p:cNvPr>
+          <p:cNvPicPr>
+            <a:picLocks noChangeAspect="1"/>
+          </p:cNvPicPr>
+          <p:nvPr/>
+        </p:nvPicPr>
+        <p:blipFill>
+          <a:blip r:embed="rId5"/>
+          <a:stretch>
+            <a:fillRect/>
+          </a:stretch>
+        </p:blipFill>
+        <p:spPr>
+          <a:xfrm>
+            <a:off x="1044926" y="1628272"/>
+            <a:ext cx="10055693" cy="5000521"/>
+          </a:xfrm>
+          <a:prstGeom prst="rect">
+            <a:avLst/>
+          </a:prstGeom>
+        </p:spPr>
+      </p:pic>
     </p:spTree>
     <p:extLst>
       <p:ext uri="{BB962C8B-B14F-4D97-AF65-F5344CB8AC3E}">
-        <p14:creationId xmlns:p14="http://schemas.microsoft.com/office/powerpoint/2010/main" val="2438667681"/>
+        <p14:creationId xmlns:p14="http://schemas.microsoft.com/office/powerpoint/2010/main" val="2940858589"/>
+      </p:ext>
+    </p:extLst>
+  </p:cSld>
+  <p:clrMapOvr>
+    <a:overrideClrMapping bg1="dk1" tx1="lt1" bg2="dk2" tx2="lt2" accent1="accent1" accent2="accent2" accent3="accent3" accent4="accent4" accent5="accent5" accent6="accent6" hlink="hlink" folHlink="folHlink"/>
+  </p:clrMapOvr>
+</p:sld>
+</file>
+
+<file path=ppt/slides/slide18.xml><?xml version="1.0" encoding="utf-8"?>
+<p:sld xmlns:a="http://schemas.openxmlformats.org/drawingml/2006/main" xmlns:r="http://schemas.openxmlformats.org/officeDocument/2006/relationships" xmlns:p="http://schemas.openxmlformats.org/presentationml/2006/main">
+  <p:cSld>
+    <p:bg>
+      <p:bgPr>
+        <a:solidFill>
+          <a:srgbClr val="000000"/>
+        </a:solidFill>
+        <a:effectLst/>
+      </p:bgPr>
+    </p:bg>
+    <p:spTree>
+      <p:nvGrpSpPr>
+        <p:cNvPr id="1" name=""/>
+        <p:cNvGrpSpPr/>
+        <p:nvPr/>
+      </p:nvGrpSpPr>
+      <p:grpSpPr>
+        <a:xfrm>
+          <a:off x="0" y="0"/>
+          <a:ext cx="0" cy="0"/>
+          <a:chOff x="0" y="0"/>
+          <a:chExt cx="0" cy="0"/>
+        </a:xfrm>
+      </p:grpSpPr>
+      <p:sp>
+        <p:nvSpPr>
+          <p:cNvPr id="10" name="Rectangle 9">
+            <a:extLst>
+              <a:ext uri="{FF2B5EF4-FFF2-40B4-BE49-F238E27FC236}">
+                <a16:creationId xmlns:a16="http://schemas.microsoft.com/office/drawing/2014/main" id="{71B2258F-86CA-4D4D-8270-BC05FCDEBFB3}"/>
+              </a:ext>
+              <a:ext uri="{C183D7F6-B498-43B3-948B-1728B52AA6E4}">
+                <adec:decorative xmlns:adec="http://schemas.microsoft.com/office/drawing/2017/decorative" val="1"/>
+              </a:ext>
+            </a:extLst>
+          </p:cNvPr>
+          <p:cNvSpPr>
+            <a:spLocks noGrp="1" noRot="1" noChangeAspect="1" noMove="1" noResize="1" noEditPoints="1" noAdjustHandles="1" noChangeArrowheads="1" noChangeShapeType="1" noTextEdit="1"/>
+          </p:cNvSpPr>
+          <p:nvPr>
+            <p:extLst>
+              <p:ext uri="{386F3935-93C4-4BCD-93E2-E3B085C9AB24}">
+                <p16:designElem xmlns:p16="http://schemas.microsoft.com/office/powerpoint/2015/main" val="1"/>
+              </p:ext>
+            </p:extLst>
+          </p:nvPr>
+        </p:nvSpPr>
+        <p:spPr>
+          <a:xfrm>
+            <a:off x="0" y="0"/>
+            <a:ext cx="12192000" cy="6857999"/>
+          </a:xfrm>
+          <a:prstGeom prst="rect">
+            <a:avLst/>
+          </a:prstGeom>
+          <a:solidFill>
+            <a:srgbClr val="000000"/>
+          </a:solidFill>
+          <a:ln>
+            <a:noFill/>
+          </a:ln>
+        </p:spPr>
+        <p:style>
+          <a:lnRef idx="2">
+            <a:schemeClr val="accent1">
+              <a:shade val="50000"/>
+            </a:schemeClr>
+          </a:lnRef>
+          <a:fillRef idx="1">
+            <a:schemeClr val="accent1"/>
+          </a:fillRef>
+          <a:effectRef idx="0">
+            <a:schemeClr val="accent1"/>
+          </a:effectRef>
+          <a:fontRef idx="minor">
+            <a:schemeClr val="lt1"/>
+          </a:fontRef>
+        </p:style>
+        <p:txBody>
+          <a:bodyPr rtlCol="0" anchor="ctr"/>
+          <a:lstStyle/>
+          <a:p>
+            <a:pPr algn="ctr"/>
+            <a:endParaRPr lang="en-US"/>
+          </a:p>
+        </p:txBody>
+      </p:sp>
+      <p:pic>
+        <p:nvPicPr>
+          <p:cNvPr id="5" name="Picture 4" descr="A galaxy in the sky&#10;&#10;Description automatically generated with medium confidence">
+            <a:extLst>
+              <a:ext uri="{FF2B5EF4-FFF2-40B4-BE49-F238E27FC236}">
+                <a16:creationId xmlns:a16="http://schemas.microsoft.com/office/drawing/2014/main" id="{B0F90A88-2372-3D69-96D2-BB8F636DDE9E}"/>
+              </a:ext>
+            </a:extLst>
+          </p:cNvPr>
+          <p:cNvPicPr>
+            <a:picLocks noChangeAspect="1"/>
+          </p:cNvPicPr>
+          <p:nvPr/>
+        </p:nvPicPr>
+        <p:blipFill rotWithShape="1">
+          <a:blip r:embed="rId3">
+            <a:alphaModFix amt="50000"/>
+            <a:extLst>
+              <a:ext uri="{28A0092B-C50C-407E-A947-70E740481C1C}">
+                <a14:useLocalDpi xmlns:a14="http://schemas.microsoft.com/office/drawing/2010/main" val="0"/>
+              </a:ext>
+            </a:extLst>
+          </a:blip>
+          <a:srcRect/>
+          <a:stretch/>
+        </p:blipFill>
+        <p:spPr>
+          <a:xfrm>
+            <a:off x="0" y="0"/>
+            <a:ext cx="12192000" cy="6858000"/>
+          </a:xfrm>
+          <a:prstGeom prst="rect">
+            <a:avLst/>
+          </a:prstGeom>
+        </p:spPr>
+      </p:pic>
+      <p:sp>
+        <p:nvSpPr>
+          <p:cNvPr id="9" name="TextBox 8">
+            <a:extLst>
+              <a:ext uri="{FF2B5EF4-FFF2-40B4-BE49-F238E27FC236}">
+                <a16:creationId xmlns:a16="http://schemas.microsoft.com/office/drawing/2014/main" id="{7DCA9D16-5034-279C-FF1F-96C45AF4B68F}"/>
+              </a:ext>
+            </a:extLst>
+          </p:cNvPr>
+          <p:cNvSpPr txBox="1"/>
+          <p:nvPr/>
+        </p:nvSpPr>
+        <p:spPr>
+          <a:xfrm>
+            <a:off x="301732" y="293576"/>
+            <a:ext cx="978428" cy="523220"/>
+          </a:xfrm>
+          <a:prstGeom prst="rect">
+            <a:avLst/>
+          </a:prstGeom>
+          <a:noFill/>
+        </p:spPr>
+        <p:txBody>
+          <a:bodyPr wrap="square" rtlCol="0">
+            <a:spAutoFit/>
+          </a:bodyPr>
+          <a:lstStyle/>
+          <a:p>
+            <a:r>
+              <a:rPr lang="en-GB" sz="2800" b="1" dirty="0"/>
+              <a:t>Test</a:t>
+            </a:r>
+          </a:p>
+        </p:txBody>
+      </p:sp>
+      <p:pic>
+        <p:nvPicPr>
+          <p:cNvPr id="15" name="Picture 14" descr="A blue and white logo&#10;&#10;Description automatically generated">
+            <a:extLst>
+              <a:ext uri="{FF2B5EF4-FFF2-40B4-BE49-F238E27FC236}">
+                <a16:creationId xmlns:a16="http://schemas.microsoft.com/office/drawing/2014/main" id="{6A2D2119-B5CD-B2DE-2CB9-9300E3B94F14}"/>
+              </a:ext>
+            </a:extLst>
+          </p:cNvPr>
+          <p:cNvPicPr>
+            <a:picLocks noChangeAspect="1"/>
+          </p:cNvPicPr>
+          <p:nvPr/>
+        </p:nvPicPr>
+        <p:blipFill>
+          <a:blip r:embed="rId4">
+            <a:extLst>
+              <a:ext uri="{28A0092B-C50C-407E-A947-70E740481C1C}">
+                <a14:useLocalDpi xmlns:a14="http://schemas.microsoft.com/office/drawing/2010/main" val="0"/>
+              </a:ext>
+            </a:extLst>
+          </a:blip>
+          <a:stretch>
+            <a:fillRect/>
+          </a:stretch>
+        </p:blipFill>
+        <p:spPr>
+          <a:xfrm>
+            <a:off x="10585151" y="264938"/>
+            <a:ext cx="1305117" cy="1098396"/>
+          </a:xfrm>
+          <a:prstGeom prst="rect">
+            <a:avLst/>
+          </a:prstGeom>
+        </p:spPr>
+      </p:pic>
+      <p:sp>
+        <p:nvSpPr>
+          <p:cNvPr id="8" name="TextBox 7">
+            <a:extLst>
+              <a:ext uri="{FF2B5EF4-FFF2-40B4-BE49-F238E27FC236}">
+                <a16:creationId xmlns:a16="http://schemas.microsoft.com/office/drawing/2014/main" id="{434CCB4D-254C-EBDE-2463-AB1821253B50}"/>
+              </a:ext>
+            </a:extLst>
+          </p:cNvPr>
+          <p:cNvSpPr txBox="1"/>
+          <p:nvPr/>
+        </p:nvSpPr>
+        <p:spPr>
+          <a:xfrm>
+            <a:off x="301732" y="1026849"/>
+            <a:ext cx="4149598" cy="369332"/>
+          </a:xfrm>
+          <a:prstGeom prst="rect">
+            <a:avLst/>
+          </a:prstGeom>
+          <a:noFill/>
+        </p:spPr>
+        <p:txBody>
+          <a:bodyPr wrap="none" rtlCol="0">
+            <a:spAutoFit/>
+          </a:bodyPr>
+          <a:lstStyle/>
+          <a:p>
+            <a:r>
+              <a:rPr lang="en-GB" dirty="0" err="1"/>
+              <a:t>Fotografia</a:t>
+            </a:r>
+            <a:r>
+              <a:rPr lang="en-GB" dirty="0"/>
+              <a:t> Deep Sky con </a:t>
+            </a:r>
+            <a:r>
+              <a:rPr lang="en-GB" dirty="0" err="1"/>
+              <a:t>condizioni</a:t>
+            </a:r>
+            <a:r>
+              <a:rPr lang="en-GB" dirty="0"/>
+              <a:t> </a:t>
+            </a:r>
+            <a:r>
+              <a:rPr lang="en-GB" dirty="0" err="1"/>
+              <a:t>medie</a:t>
+            </a:r>
+            <a:r>
+              <a:rPr lang="en-GB" dirty="0"/>
+              <a:t>.</a:t>
+            </a:r>
+          </a:p>
+        </p:txBody>
+      </p:sp>
+      <p:pic>
+        <p:nvPicPr>
+          <p:cNvPr id="3" name="Picture 2">
+            <a:extLst>
+              <a:ext uri="{FF2B5EF4-FFF2-40B4-BE49-F238E27FC236}">
+                <a16:creationId xmlns:a16="http://schemas.microsoft.com/office/drawing/2014/main" id="{C22C0336-A48B-FDC5-442E-8A35C27030F4}"/>
+              </a:ext>
+            </a:extLst>
+          </p:cNvPr>
+          <p:cNvPicPr>
+            <a:picLocks noChangeAspect="1"/>
+          </p:cNvPicPr>
+          <p:nvPr/>
+        </p:nvPicPr>
+        <p:blipFill>
+          <a:blip r:embed="rId5"/>
+          <a:stretch>
+            <a:fillRect/>
+          </a:stretch>
+        </p:blipFill>
+        <p:spPr>
+          <a:xfrm>
+            <a:off x="1205454" y="1729096"/>
+            <a:ext cx="9781092" cy="4863966"/>
+          </a:xfrm>
+          <a:prstGeom prst="rect">
+            <a:avLst/>
+          </a:prstGeom>
+        </p:spPr>
+      </p:pic>
+    </p:spTree>
+    <p:extLst>
+      <p:ext uri="{BB962C8B-B14F-4D97-AF65-F5344CB8AC3E}">
+        <p14:creationId xmlns:p14="http://schemas.microsoft.com/office/powerpoint/2010/main" val="1112807895"/>
+      </p:ext>
+    </p:extLst>
+  </p:cSld>
+  <p:clrMapOvr>
+    <a:overrideClrMapping bg1="dk1" tx1="lt1" bg2="dk2" tx2="lt2" accent1="accent1" accent2="accent2" accent3="accent3" accent4="accent4" accent5="accent5" accent6="accent6" hlink="hlink" folHlink="folHlink"/>
+  </p:clrMapOvr>
+</p:sld>
+</file>
+
+<file path=ppt/slides/slide19.xml><?xml version="1.0" encoding="utf-8"?>
+<p:sld xmlns:a="http://schemas.openxmlformats.org/drawingml/2006/main" xmlns:r="http://schemas.openxmlformats.org/officeDocument/2006/relationships" xmlns:p="http://schemas.openxmlformats.org/presentationml/2006/main">
+  <p:cSld>
+    <p:bg>
+      <p:bgPr>
+        <a:solidFill>
+          <a:srgbClr val="000000"/>
+        </a:solidFill>
+        <a:effectLst/>
+      </p:bgPr>
+    </p:bg>
+    <p:spTree>
+      <p:nvGrpSpPr>
+        <p:cNvPr id="1" name=""/>
+        <p:cNvGrpSpPr/>
+        <p:nvPr/>
+      </p:nvGrpSpPr>
+      <p:grpSpPr>
+        <a:xfrm>
+          <a:off x="0" y="0"/>
+          <a:ext cx="0" cy="0"/>
+          <a:chOff x="0" y="0"/>
+          <a:chExt cx="0" cy="0"/>
+        </a:xfrm>
+      </p:grpSpPr>
+      <p:sp>
+        <p:nvSpPr>
+          <p:cNvPr id="10" name="Rectangle 9">
+            <a:extLst>
+              <a:ext uri="{FF2B5EF4-FFF2-40B4-BE49-F238E27FC236}">
+                <a16:creationId xmlns:a16="http://schemas.microsoft.com/office/drawing/2014/main" id="{71B2258F-86CA-4D4D-8270-BC05FCDEBFB3}"/>
+              </a:ext>
+              <a:ext uri="{C183D7F6-B498-43B3-948B-1728B52AA6E4}">
+                <adec:decorative xmlns:adec="http://schemas.microsoft.com/office/drawing/2017/decorative" val="1"/>
+              </a:ext>
+            </a:extLst>
+          </p:cNvPr>
+          <p:cNvSpPr>
+            <a:spLocks noGrp="1" noRot="1" noChangeAspect="1" noMove="1" noResize="1" noEditPoints="1" noAdjustHandles="1" noChangeArrowheads="1" noChangeShapeType="1" noTextEdit="1"/>
+          </p:cNvSpPr>
+          <p:nvPr>
+            <p:extLst>
+              <p:ext uri="{386F3935-93C4-4BCD-93E2-E3B085C9AB24}">
+                <p16:designElem xmlns:p16="http://schemas.microsoft.com/office/powerpoint/2015/main" val="1"/>
+              </p:ext>
+            </p:extLst>
+          </p:nvPr>
+        </p:nvSpPr>
+        <p:spPr>
+          <a:xfrm>
+            <a:off x="0" y="0"/>
+            <a:ext cx="12192000" cy="6857999"/>
+          </a:xfrm>
+          <a:prstGeom prst="rect">
+            <a:avLst/>
+          </a:prstGeom>
+          <a:solidFill>
+            <a:srgbClr val="000000"/>
+          </a:solidFill>
+          <a:ln>
+            <a:noFill/>
+          </a:ln>
+        </p:spPr>
+        <p:style>
+          <a:lnRef idx="2">
+            <a:schemeClr val="accent1">
+              <a:shade val="50000"/>
+            </a:schemeClr>
+          </a:lnRef>
+          <a:fillRef idx="1">
+            <a:schemeClr val="accent1"/>
+          </a:fillRef>
+          <a:effectRef idx="0">
+            <a:schemeClr val="accent1"/>
+          </a:effectRef>
+          <a:fontRef idx="minor">
+            <a:schemeClr val="lt1"/>
+          </a:fontRef>
+        </p:style>
+        <p:txBody>
+          <a:bodyPr rtlCol="0" anchor="ctr"/>
+          <a:lstStyle/>
+          <a:p>
+            <a:pPr algn="ctr"/>
+            <a:endParaRPr lang="en-US"/>
+          </a:p>
+        </p:txBody>
+      </p:sp>
+      <p:pic>
+        <p:nvPicPr>
+          <p:cNvPr id="5" name="Picture 4" descr="A galaxy in the sky&#10;&#10;Description automatically generated with medium confidence">
+            <a:extLst>
+              <a:ext uri="{FF2B5EF4-FFF2-40B4-BE49-F238E27FC236}">
+                <a16:creationId xmlns:a16="http://schemas.microsoft.com/office/drawing/2014/main" id="{B0F90A88-2372-3D69-96D2-BB8F636DDE9E}"/>
+              </a:ext>
+            </a:extLst>
+          </p:cNvPr>
+          <p:cNvPicPr>
+            <a:picLocks noChangeAspect="1"/>
+          </p:cNvPicPr>
+          <p:nvPr/>
+        </p:nvPicPr>
+        <p:blipFill rotWithShape="1">
+          <a:blip r:embed="rId3">
+            <a:alphaModFix amt="50000"/>
+            <a:extLst>
+              <a:ext uri="{28A0092B-C50C-407E-A947-70E740481C1C}">
+                <a14:useLocalDpi xmlns:a14="http://schemas.microsoft.com/office/drawing/2010/main" val="0"/>
+              </a:ext>
+            </a:extLst>
+          </a:blip>
+          <a:srcRect/>
+          <a:stretch/>
+        </p:blipFill>
+        <p:spPr>
+          <a:xfrm>
+            <a:off x="0" y="0"/>
+            <a:ext cx="12192000" cy="6858000"/>
+          </a:xfrm>
+          <a:prstGeom prst="rect">
+            <a:avLst/>
+          </a:prstGeom>
+        </p:spPr>
+      </p:pic>
+      <p:sp>
+        <p:nvSpPr>
+          <p:cNvPr id="9" name="TextBox 8">
+            <a:extLst>
+              <a:ext uri="{FF2B5EF4-FFF2-40B4-BE49-F238E27FC236}">
+                <a16:creationId xmlns:a16="http://schemas.microsoft.com/office/drawing/2014/main" id="{7DCA9D16-5034-279C-FF1F-96C45AF4B68F}"/>
+              </a:ext>
+            </a:extLst>
+          </p:cNvPr>
+          <p:cNvSpPr txBox="1"/>
+          <p:nvPr/>
+        </p:nvSpPr>
+        <p:spPr>
+          <a:xfrm>
+            <a:off x="301732" y="293576"/>
+            <a:ext cx="978428" cy="523220"/>
+          </a:xfrm>
+          <a:prstGeom prst="rect">
+            <a:avLst/>
+          </a:prstGeom>
+          <a:noFill/>
+        </p:spPr>
+        <p:txBody>
+          <a:bodyPr wrap="square" rtlCol="0">
+            <a:spAutoFit/>
+          </a:bodyPr>
+          <a:lstStyle/>
+          <a:p>
+            <a:r>
+              <a:rPr lang="en-GB" sz="2800" b="1" dirty="0"/>
+              <a:t>Test</a:t>
+            </a:r>
+          </a:p>
+        </p:txBody>
+      </p:sp>
+      <p:pic>
+        <p:nvPicPr>
+          <p:cNvPr id="15" name="Picture 14" descr="A blue and white logo&#10;&#10;Description automatically generated">
+            <a:extLst>
+              <a:ext uri="{FF2B5EF4-FFF2-40B4-BE49-F238E27FC236}">
+                <a16:creationId xmlns:a16="http://schemas.microsoft.com/office/drawing/2014/main" id="{6A2D2119-B5CD-B2DE-2CB9-9300E3B94F14}"/>
+              </a:ext>
+            </a:extLst>
+          </p:cNvPr>
+          <p:cNvPicPr>
+            <a:picLocks noChangeAspect="1"/>
+          </p:cNvPicPr>
+          <p:nvPr/>
+        </p:nvPicPr>
+        <p:blipFill>
+          <a:blip r:embed="rId4">
+            <a:extLst>
+              <a:ext uri="{28A0092B-C50C-407E-A947-70E740481C1C}">
+                <a14:useLocalDpi xmlns:a14="http://schemas.microsoft.com/office/drawing/2010/main" val="0"/>
+              </a:ext>
+            </a:extLst>
+          </a:blip>
+          <a:stretch>
+            <a:fillRect/>
+          </a:stretch>
+        </p:blipFill>
+        <p:spPr>
+          <a:xfrm>
+            <a:off x="10585151" y="264938"/>
+            <a:ext cx="1305117" cy="1098396"/>
+          </a:xfrm>
+          <a:prstGeom prst="rect">
+            <a:avLst/>
+          </a:prstGeom>
+        </p:spPr>
+      </p:pic>
+    </p:spTree>
+    <p:extLst>
+      <p:ext uri="{BB962C8B-B14F-4D97-AF65-F5344CB8AC3E}">
+        <p14:creationId xmlns:p14="http://schemas.microsoft.com/office/powerpoint/2010/main" val="299009378"/>
       </p:ext>
     </p:extLst>
   </p:cSld>
@@ -11066,6 +12713,492 @@
     <p:extLst>
       <p:ext uri="{BB962C8B-B14F-4D97-AF65-F5344CB8AC3E}">
         <p14:creationId xmlns:p14="http://schemas.microsoft.com/office/powerpoint/2010/main" val="4172560365"/>
+      </p:ext>
+    </p:extLst>
+  </p:cSld>
+  <p:clrMapOvr>
+    <a:overrideClrMapping bg1="dk1" tx1="lt1" bg2="dk2" tx2="lt2" accent1="accent1" accent2="accent2" accent3="accent3" accent4="accent4" accent5="accent5" accent6="accent6" hlink="hlink" folHlink="folHlink"/>
+  </p:clrMapOvr>
+</p:sld>
+</file>
+
+<file path=ppt/slides/slide20.xml><?xml version="1.0" encoding="utf-8"?>
+<p:sld xmlns:a="http://schemas.openxmlformats.org/drawingml/2006/main" xmlns:r="http://schemas.openxmlformats.org/officeDocument/2006/relationships" xmlns:p="http://schemas.openxmlformats.org/presentationml/2006/main">
+  <p:cSld>
+    <p:bg>
+      <p:bgPr>
+        <a:solidFill>
+          <a:srgbClr val="000000"/>
+        </a:solidFill>
+        <a:effectLst/>
+      </p:bgPr>
+    </p:bg>
+    <p:spTree>
+      <p:nvGrpSpPr>
+        <p:cNvPr id="1" name=""/>
+        <p:cNvGrpSpPr/>
+        <p:nvPr/>
+      </p:nvGrpSpPr>
+      <p:grpSpPr>
+        <a:xfrm>
+          <a:off x="0" y="0"/>
+          <a:ext cx="0" cy="0"/>
+          <a:chOff x="0" y="0"/>
+          <a:chExt cx="0" cy="0"/>
+        </a:xfrm>
+      </p:grpSpPr>
+      <p:sp>
+        <p:nvSpPr>
+          <p:cNvPr id="10" name="Rectangle 9">
+            <a:extLst>
+              <a:ext uri="{FF2B5EF4-FFF2-40B4-BE49-F238E27FC236}">
+                <a16:creationId xmlns:a16="http://schemas.microsoft.com/office/drawing/2014/main" id="{71B2258F-86CA-4D4D-8270-BC05FCDEBFB3}"/>
+              </a:ext>
+              <a:ext uri="{C183D7F6-B498-43B3-948B-1728B52AA6E4}">
+                <adec:decorative xmlns:adec="http://schemas.microsoft.com/office/drawing/2017/decorative" val="1"/>
+              </a:ext>
+            </a:extLst>
+          </p:cNvPr>
+          <p:cNvSpPr>
+            <a:spLocks noGrp="1" noRot="1" noChangeAspect="1" noMove="1" noResize="1" noEditPoints="1" noAdjustHandles="1" noChangeArrowheads="1" noChangeShapeType="1" noTextEdit="1"/>
+          </p:cNvSpPr>
+          <p:nvPr>
+            <p:extLst>
+              <p:ext uri="{386F3935-93C4-4BCD-93E2-E3B085C9AB24}">
+                <p16:designElem xmlns:p16="http://schemas.microsoft.com/office/powerpoint/2015/main" val="1"/>
+              </p:ext>
+            </p:extLst>
+          </p:nvPr>
+        </p:nvSpPr>
+        <p:spPr>
+          <a:xfrm>
+            <a:off x="0" y="0"/>
+            <a:ext cx="12192000" cy="6857999"/>
+          </a:xfrm>
+          <a:prstGeom prst="rect">
+            <a:avLst/>
+          </a:prstGeom>
+          <a:solidFill>
+            <a:srgbClr val="000000"/>
+          </a:solidFill>
+          <a:ln>
+            <a:noFill/>
+          </a:ln>
+        </p:spPr>
+        <p:style>
+          <a:lnRef idx="2">
+            <a:schemeClr val="accent1">
+              <a:shade val="50000"/>
+            </a:schemeClr>
+          </a:lnRef>
+          <a:fillRef idx="1">
+            <a:schemeClr val="accent1"/>
+          </a:fillRef>
+          <a:effectRef idx="0">
+            <a:schemeClr val="accent1"/>
+          </a:effectRef>
+          <a:fontRef idx="minor">
+            <a:schemeClr val="lt1"/>
+          </a:fontRef>
+        </p:style>
+        <p:txBody>
+          <a:bodyPr rtlCol="0" anchor="ctr"/>
+          <a:lstStyle/>
+          <a:p>
+            <a:pPr algn="ctr"/>
+            <a:endParaRPr lang="en-US"/>
+          </a:p>
+        </p:txBody>
+      </p:sp>
+      <p:pic>
+        <p:nvPicPr>
+          <p:cNvPr id="5" name="Picture 4" descr="A galaxy in the sky&#10;&#10;Description automatically generated with medium confidence">
+            <a:extLst>
+              <a:ext uri="{FF2B5EF4-FFF2-40B4-BE49-F238E27FC236}">
+                <a16:creationId xmlns:a16="http://schemas.microsoft.com/office/drawing/2014/main" id="{B0F90A88-2372-3D69-96D2-BB8F636DDE9E}"/>
+              </a:ext>
+            </a:extLst>
+          </p:cNvPr>
+          <p:cNvPicPr>
+            <a:picLocks noChangeAspect="1"/>
+          </p:cNvPicPr>
+          <p:nvPr/>
+        </p:nvPicPr>
+        <p:blipFill rotWithShape="1">
+          <a:blip r:embed="rId3">
+            <a:alphaModFix amt="50000"/>
+            <a:extLst>
+              <a:ext uri="{28A0092B-C50C-407E-A947-70E740481C1C}">
+                <a14:useLocalDpi xmlns:a14="http://schemas.microsoft.com/office/drawing/2010/main" val="0"/>
+              </a:ext>
+            </a:extLst>
+          </a:blip>
+          <a:srcRect/>
+          <a:stretch/>
+        </p:blipFill>
+        <p:spPr>
+          <a:xfrm>
+            <a:off x="0" y="0"/>
+            <a:ext cx="12192000" cy="6858000"/>
+          </a:xfrm>
+          <a:prstGeom prst="rect">
+            <a:avLst/>
+          </a:prstGeom>
+        </p:spPr>
+      </p:pic>
+      <p:sp>
+        <p:nvSpPr>
+          <p:cNvPr id="9" name="TextBox 8">
+            <a:extLst>
+              <a:ext uri="{FF2B5EF4-FFF2-40B4-BE49-F238E27FC236}">
+                <a16:creationId xmlns:a16="http://schemas.microsoft.com/office/drawing/2014/main" id="{7DCA9D16-5034-279C-FF1F-96C45AF4B68F}"/>
+              </a:ext>
+            </a:extLst>
+          </p:cNvPr>
+          <p:cNvSpPr txBox="1"/>
+          <p:nvPr/>
+        </p:nvSpPr>
+        <p:spPr>
+          <a:xfrm>
+            <a:off x="301732" y="293576"/>
+            <a:ext cx="3456452" cy="523220"/>
+          </a:xfrm>
+          <a:prstGeom prst="rect">
+            <a:avLst/>
+          </a:prstGeom>
+          <a:noFill/>
+        </p:spPr>
+        <p:txBody>
+          <a:bodyPr wrap="square" rtlCol="0">
+            <a:spAutoFit/>
+          </a:bodyPr>
+          <a:lstStyle/>
+          <a:p>
+            <a:r>
+              <a:rPr lang="en-GB" sz="2800" b="1" dirty="0" err="1"/>
+              <a:t>Casi</a:t>
+            </a:r>
+            <a:r>
+              <a:rPr lang="en-GB" sz="2800" b="1" dirty="0"/>
+              <a:t> limite</a:t>
+            </a:r>
+          </a:p>
+        </p:txBody>
+      </p:sp>
+      <p:pic>
+        <p:nvPicPr>
+          <p:cNvPr id="15" name="Picture 14" descr="A blue and white logo&#10;&#10;Description automatically generated">
+            <a:extLst>
+              <a:ext uri="{FF2B5EF4-FFF2-40B4-BE49-F238E27FC236}">
+                <a16:creationId xmlns:a16="http://schemas.microsoft.com/office/drawing/2014/main" id="{6A2D2119-B5CD-B2DE-2CB9-9300E3B94F14}"/>
+              </a:ext>
+            </a:extLst>
+          </p:cNvPr>
+          <p:cNvPicPr>
+            <a:picLocks noChangeAspect="1"/>
+          </p:cNvPicPr>
+          <p:nvPr/>
+        </p:nvPicPr>
+        <p:blipFill>
+          <a:blip r:embed="rId4">
+            <a:extLst>
+              <a:ext uri="{28A0092B-C50C-407E-A947-70E740481C1C}">
+                <a14:useLocalDpi xmlns:a14="http://schemas.microsoft.com/office/drawing/2010/main" val="0"/>
+              </a:ext>
+            </a:extLst>
+          </a:blip>
+          <a:stretch>
+            <a:fillRect/>
+          </a:stretch>
+        </p:blipFill>
+        <p:spPr>
+          <a:xfrm>
+            <a:off x="10585151" y="264938"/>
+            <a:ext cx="1305117" cy="1098396"/>
+          </a:xfrm>
+          <a:prstGeom prst="rect">
+            <a:avLst/>
+          </a:prstGeom>
+        </p:spPr>
+      </p:pic>
+    </p:spTree>
+    <p:extLst>
+      <p:ext uri="{BB962C8B-B14F-4D97-AF65-F5344CB8AC3E}">
+        <p14:creationId xmlns:p14="http://schemas.microsoft.com/office/powerpoint/2010/main" val="1668053405"/>
+      </p:ext>
+    </p:extLst>
+  </p:cSld>
+  <p:clrMapOvr>
+    <a:overrideClrMapping bg1="dk1" tx1="lt1" bg2="dk2" tx2="lt2" accent1="accent1" accent2="accent2" accent3="accent3" accent4="accent4" accent5="accent5" accent6="accent6" hlink="hlink" folHlink="folHlink"/>
+  </p:clrMapOvr>
+</p:sld>
+</file>
+
+<file path=ppt/slides/slide21.xml><?xml version="1.0" encoding="utf-8"?>
+<p:sld xmlns:a="http://schemas.openxmlformats.org/drawingml/2006/main" xmlns:r="http://schemas.openxmlformats.org/officeDocument/2006/relationships" xmlns:p="http://schemas.openxmlformats.org/presentationml/2006/main">
+  <p:cSld>
+    <p:bg>
+      <p:bgPr>
+        <a:solidFill>
+          <a:srgbClr val="000000"/>
+        </a:solidFill>
+        <a:effectLst/>
+      </p:bgPr>
+    </p:bg>
+    <p:spTree>
+      <p:nvGrpSpPr>
+        <p:cNvPr id="1" name=""/>
+        <p:cNvGrpSpPr/>
+        <p:nvPr/>
+      </p:nvGrpSpPr>
+      <p:grpSpPr>
+        <a:xfrm>
+          <a:off x="0" y="0"/>
+          <a:ext cx="0" cy="0"/>
+          <a:chOff x="0" y="0"/>
+          <a:chExt cx="0" cy="0"/>
+        </a:xfrm>
+      </p:grpSpPr>
+      <p:sp>
+        <p:nvSpPr>
+          <p:cNvPr id="10" name="Rectangle 9">
+            <a:extLst>
+              <a:ext uri="{FF2B5EF4-FFF2-40B4-BE49-F238E27FC236}">
+                <a16:creationId xmlns:a16="http://schemas.microsoft.com/office/drawing/2014/main" id="{71B2258F-86CA-4D4D-8270-BC05FCDEBFB3}"/>
+              </a:ext>
+              <a:ext uri="{C183D7F6-B498-43B3-948B-1728B52AA6E4}">
+                <adec:decorative xmlns:adec="http://schemas.microsoft.com/office/drawing/2017/decorative" val="1"/>
+              </a:ext>
+            </a:extLst>
+          </p:cNvPr>
+          <p:cNvSpPr>
+            <a:spLocks noGrp="1" noRot="1" noChangeAspect="1" noMove="1" noResize="1" noEditPoints="1" noAdjustHandles="1" noChangeArrowheads="1" noChangeShapeType="1" noTextEdit="1"/>
+          </p:cNvSpPr>
+          <p:nvPr>
+            <p:extLst>
+              <p:ext uri="{386F3935-93C4-4BCD-93E2-E3B085C9AB24}">
+                <p16:designElem xmlns:p16="http://schemas.microsoft.com/office/powerpoint/2015/main" val="1"/>
+              </p:ext>
+            </p:extLst>
+          </p:nvPr>
+        </p:nvSpPr>
+        <p:spPr>
+          <a:xfrm>
+            <a:off x="0" y="0"/>
+            <a:ext cx="12192000" cy="6857999"/>
+          </a:xfrm>
+          <a:prstGeom prst="rect">
+            <a:avLst/>
+          </a:prstGeom>
+          <a:solidFill>
+            <a:srgbClr val="000000"/>
+          </a:solidFill>
+          <a:ln>
+            <a:noFill/>
+          </a:ln>
+        </p:spPr>
+        <p:style>
+          <a:lnRef idx="2">
+            <a:schemeClr val="accent1">
+              <a:shade val="50000"/>
+            </a:schemeClr>
+          </a:lnRef>
+          <a:fillRef idx="1">
+            <a:schemeClr val="accent1"/>
+          </a:fillRef>
+          <a:effectRef idx="0">
+            <a:schemeClr val="accent1"/>
+          </a:effectRef>
+          <a:fontRef idx="minor">
+            <a:schemeClr val="lt1"/>
+          </a:fontRef>
+        </p:style>
+        <p:txBody>
+          <a:bodyPr rtlCol="0" anchor="ctr"/>
+          <a:lstStyle/>
+          <a:p>
+            <a:pPr algn="ctr"/>
+            <a:endParaRPr lang="en-US"/>
+          </a:p>
+        </p:txBody>
+      </p:sp>
+      <p:pic>
+        <p:nvPicPr>
+          <p:cNvPr id="5" name="Picture 4" descr="A galaxy in the sky&#10;&#10;Description automatically generated with medium confidence">
+            <a:extLst>
+              <a:ext uri="{FF2B5EF4-FFF2-40B4-BE49-F238E27FC236}">
+                <a16:creationId xmlns:a16="http://schemas.microsoft.com/office/drawing/2014/main" id="{B0F90A88-2372-3D69-96D2-BB8F636DDE9E}"/>
+              </a:ext>
+            </a:extLst>
+          </p:cNvPr>
+          <p:cNvPicPr>
+            <a:picLocks noChangeAspect="1"/>
+          </p:cNvPicPr>
+          <p:nvPr/>
+        </p:nvPicPr>
+        <p:blipFill rotWithShape="1">
+          <a:blip r:embed="rId3">
+            <a:alphaModFix amt="50000"/>
+            <a:extLst>
+              <a:ext uri="{28A0092B-C50C-407E-A947-70E740481C1C}">
+                <a14:useLocalDpi xmlns:a14="http://schemas.microsoft.com/office/drawing/2010/main" val="0"/>
+              </a:ext>
+            </a:extLst>
+          </a:blip>
+          <a:srcRect/>
+          <a:stretch/>
+        </p:blipFill>
+        <p:spPr>
+          <a:xfrm>
+            <a:off x="0" y="0"/>
+            <a:ext cx="12192000" cy="6858000"/>
+          </a:xfrm>
+          <a:prstGeom prst="rect">
+            <a:avLst/>
+          </a:prstGeom>
+        </p:spPr>
+      </p:pic>
+      <p:pic>
+        <p:nvPicPr>
+          <p:cNvPr id="15" name="Picture 14" descr="A blue and white logo&#10;&#10;Description automatically generated">
+            <a:extLst>
+              <a:ext uri="{FF2B5EF4-FFF2-40B4-BE49-F238E27FC236}">
+                <a16:creationId xmlns:a16="http://schemas.microsoft.com/office/drawing/2014/main" id="{6A2D2119-B5CD-B2DE-2CB9-9300E3B94F14}"/>
+              </a:ext>
+            </a:extLst>
+          </p:cNvPr>
+          <p:cNvPicPr>
+            <a:picLocks noChangeAspect="1"/>
+          </p:cNvPicPr>
+          <p:nvPr/>
+        </p:nvPicPr>
+        <p:blipFill>
+          <a:blip r:embed="rId4">
+            <a:extLst>
+              <a:ext uri="{28A0092B-C50C-407E-A947-70E740481C1C}">
+                <a14:useLocalDpi xmlns:a14="http://schemas.microsoft.com/office/drawing/2010/main" val="0"/>
+              </a:ext>
+            </a:extLst>
+          </a:blip>
+          <a:stretch>
+            <a:fillRect/>
+          </a:stretch>
+        </p:blipFill>
+        <p:spPr>
+          <a:xfrm>
+            <a:off x="10585151" y="264938"/>
+            <a:ext cx="1305117" cy="1098396"/>
+          </a:xfrm>
+          <a:prstGeom prst="rect">
+            <a:avLst/>
+          </a:prstGeom>
+        </p:spPr>
+      </p:pic>
+      <p:sp>
+        <p:nvSpPr>
+          <p:cNvPr id="2" name="TextBox 1">
+            <a:extLst>
+              <a:ext uri="{FF2B5EF4-FFF2-40B4-BE49-F238E27FC236}">
+                <a16:creationId xmlns:a16="http://schemas.microsoft.com/office/drawing/2014/main" id="{A16A756F-7D09-52EE-CD05-3CF4139DC46D}"/>
+              </a:ext>
+            </a:extLst>
+          </p:cNvPr>
+          <p:cNvSpPr txBox="1"/>
+          <p:nvPr/>
+        </p:nvSpPr>
+        <p:spPr>
+          <a:xfrm>
+            <a:off x="2547817" y="2921167"/>
+            <a:ext cx="7096366" cy="1015663"/>
+          </a:xfrm>
+          <a:prstGeom prst="rect">
+            <a:avLst/>
+          </a:prstGeom>
+          <a:noFill/>
+        </p:spPr>
+        <p:txBody>
+          <a:bodyPr wrap="none" rtlCol="0">
+            <a:spAutoFit/>
+          </a:bodyPr>
+          <a:lstStyle/>
+          <a:p>
+            <a:r>
+              <a:rPr lang="en-GB" sz="6000" b="1" dirty="0">
+                <a:latin typeface="+mj-lt"/>
+              </a:rPr>
+              <a:t>Grazie per </a:t>
+            </a:r>
+            <a:r>
+              <a:rPr lang="en-GB" sz="6000" b="1" dirty="0" err="1">
+                <a:latin typeface="+mj-lt"/>
+              </a:rPr>
+              <a:t>l’attenzione</a:t>
+            </a:r>
+            <a:endParaRPr lang="en-GB" sz="6000" b="1" dirty="0">
+              <a:latin typeface="+mj-lt"/>
+            </a:endParaRPr>
+          </a:p>
+        </p:txBody>
+      </p:sp>
+      <p:sp>
+        <p:nvSpPr>
+          <p:cNvPr id="3" name="TextBox 2">
+            <a:extLst>
+              <a:ext uri="{FF2B5EF4-FFF2-40B4-BE49-F238E27FC236}">
+                <a16:creationId xmlns:a16="http://schemas.microsoft.com/office/drawing/2014/main" id="{C9D28ED9-E95D-507E-FC43-A20B7E08E910}"/>
+              </a:ext>
+            </a:extLst>
+          </p:cNvPr>
+          <p:cNvSpPr txBox="1"/>
+          <p:nvPr/>
+        </p:nvSpPr>
+        <p:spPr>
+          <a:xfrm>
+            <a:off x="228600" y="6350169"/>
+            <a:ext cx="5733429" cy="338554"/>
+          </a:xfrm>
+          <a:prstGeom prst="rect">
+            <a:avLst/>
+          </a:prstGeom>
+          <a:noFill/>
+        </p:spPr>
+        <p:txBody>
+          <a:bodyPr wrap="none" rtlCol="0">
+            <a:spAutoFit/>
+          </a:bodyPr>
+          <a:lstStyle/>
+          <a:p>
+            <a:r>
+              <a:rPr lang="en-GB" sz="1600" dirty="0" err="1"/>
+              <a:t>Autori</a:t>
+            </a:r>
+            <a:r>
+              <a:rPr lang="en-GB" sz="1600" dirty="0"/>
+              <a:t> del </a:t>
+            </a:r>
+            <a:r>
+              <a:rPr lang="en-GB" sz="1600" dirty="0" err="1"/>
+              <a:t>progetto</a:t>
+            </a:r>
+            <a:r>
+              <a:rPr lang="en-GB" sz="1600" dirty="0"/>
+              <a:t>: Riccardo </a:t>
+            </a:r>
+            <a:r>
+              <a:rPr lang="en-GB" sz="1600" dirty="0" err="1"/>
+              <a:t>Polacchi</a:t>
+            </a:r>
+            <a:r>
+              <a:rPr lang="en-GB" sz="1600" dirty="0"/>
+              <a:t> &amp; Ignazio Emanuele Piccichè</a:t>
+            </a:r>
+          </a:p>
+        </p:txBody>
+      </p:sp>
+    </p:spTree>
+    <p:extLst>
+      <p:ext uri="{BB962C8B-B14F-4D97-AF65-F5344CB8AC3E}">
+        <p14:creationId xmlns:p14="http://schemas.microsoft.com/office/powerpoint/2010/main" val="2438667681"/>
       </p:ext>
     </p:extLst>
   </p:cSld>
@@ -12601,8 +14734,8 @@
         </p:blipFill>
         <p:spPr>
           <a:xfrm>
-            <a:off x="7606258" y="1363334"/>
-            <a:ext cx="2956584" cy="1773951"/>
+            <a:off x="7234797" y="2032358"/>
+            <a:ext cx="4655471" cy="2793284"/>
           </a:xfrm>
           <a:prstGeom prst="rect">
             <a:avLst/>
@@ -12623,8 +14756,8 @@
         </p:nvSpPr>
         <p:spPr>
           <a:xfrm>
-            <a:off x="1055077" y="3643532"/>
-            <a:ext cx="6551181" cy="1200329"/>
+            <a:off x="301732" y="5459651"/>
+            <a:ext cx="11202010" cy="923330"/>
           </a:xfrm>
           <a:prstGeom prst="rect">
             <a:avLst/>
@@ -12886,8 +15019,8 @@
         </p:nvSpPr>
         <p:spPr>
           <a:xfrm>
-            <a:off x="301732" y="5022217"/>
-            <a:ext cx="9166733" cy="1200329"/>
+            <a:off x="301732" y="5340959"/>
+            <a:ext cx="11588536" cy="923330"/>
           </a:xfrm>
           <a:prstGeom prst="rect">
             <a:avLst/>
@@ -13157,7 +15290,7 @@
         </p:blipFill>
         <p:spPr>
           <a:xfrm>
-            <a:off x="7612337" y="1517041"/>
+            <a:off x="7310605" y="1959808"/>
             <a:ext cx="4579663" cy="2784676"/>
           </a:xfrm>
           <a:prstGeom prst="rect">
@@ -13399,8 +15532,8 @@
         </p:nvSpPr>
         <p:spPr>
           <a:xfrm>
-            <a:off x="301732" y="5022218"/>
-            <a:ext cx="10553081" cy="1477328"/>
+            <a:off x="301732" y="5100391"/>
+            <a:ext cx="11588536" cy="1200329"/>
           </a:xfrm>
           <a:prstGeom prst="rect">
             <a:avLst/>
@@ -13774,8 +15907,8 @@
         </p:blipFill>
         <p:spPr>
           <a:xfrm>
-            <a:off x="2951847" y="1034258"/>
-            <a:ext cx="6284643" cy="3809031"/>
+            <a:off x="7423355" y="1835782"/>
+            <a:ext cx="4466913" cy="2707331"/>
           </a:xfrm>
           <a:prstGeom prst="rect">
             <a:avLst/>
@@ -14024,8 +16157,8 @@
         </p:nvSpPr>
         <p:spPr>
           <a:xfrm>
-            <a:off x="301732" y="5022217"/>
-            <a:ext cx="9373210" cy="923330"/>
+            <a:off x="301732" y="5634578"/>
+            <a:ext cx="11588536" cy="646331"/>
           </a:xfrm>
           <a:prstGeom prst="rect">
             <a:avLst/>
@@ -14239,8 +16372,8 @@
         </p:blipFill>
         <p:spPr>
           <a:xfrm>
-            <a:off x="2951127" y="1068089"/>
-            <a:ext cx="6277974" cy="3741368"/>
+            <a:off x="7128386" y="2080031"/>
+            <a:ext cx="4761882" cy="2837850"/>
           </a:xfrm>
           <a:prstGeom prst="rect">
             <a:avLst/>

</xml_diff>